<commit_message>
Updated code to Courier New in Recursion
</commit_message>
<xml_diff>
--- a/Python/Lesson 99 - Recursion/AI2C Python - Recursion.pptx
+++ b/Python/Lesson 99 - Recursion/AI2C Python - Recursion.pptx
@@ -135,7 +135,7 @@
 <file path=ppt/revisionInfo.xml><?xml version="1.0" encoding="utf-8"?>
 <p1510:revInfo xmlns:a="http://schemas.openxmlformats.org/drawingml/2006/main" xmlns:r="http://schemas.openxmlformats.org/officeDocument/2006/relationships" xmlns:p1510="http://schemas.microsoft.com/office/powerpoint/2015/10/main">
   <p1510:revLst>
-    <p1510:client id="{20DDAD46-DEF6-B7D0-A7D3-6879BF5B2153}" v="530" dt="2025-12-23T16:08:06.649"/>
+    <p1510:client id="{20DDAD46-DEF6-B7D0-A7D3-6879BF5B2153}" v="629" dt="2025-12-23T16:40:27.664"/>
     <p1510:client id="{FFEED2B6-54C5-4E72-9ACA-FD1F60CA9349}" v="20" dt="2025-12-22T14:37:28.317"/>
   </p1510:revLst>
 </p1510:revInfo>
@@ -2197,7 +2197,7 @@
               <a:defRPr/>
             </a:pPr>
             <a:r>
-              <a:rPr lang="en-US" sz="700" b="1" dirty="0">
+              <a:rPr lang="en-US" sz="700" b="1">
                 <a:solidFill>
                   <a:srgbClr val="2DAA27"/>
                 </a:solidFill>
@@ -2249,7 +2249,7 @@
               <a:defRPr/>
             </a:pPr>
             <a:r>
-              <a:rPr lang="en-US" sz="700" b="1" dirty="0">
+              <a:rPr lang="en-US" sz="700" b="1">
                 <a:solidFill>
                   <a:srgbClr val="2DAA27"/>
                 </a:solidFill>
@@ -10274,7 +10274,7 @@
               <a:defRPr/>
             </a:pPr>
             <a:r>
-              <a:rPr lang="en-US" sz="700" b="1" dirty="0">
+              <a:rPr lang="en-US" sz="700" b="1">
                 <a:solidFill>
                   <a:schemeClr val="tx1"/>
                 </a:solidFill>
@@ -11952,7 +11952,7 @@
           </a:lstStyle>
           <a:p>
             <a:r>
-              <a:rPr lang="en-US" dirty="0"/>
+              <a:rPr lang="en-US"/>
               <a:t>Click icon to add picture</a:t>
             </a:r>
           </a:p>
@@ -16268,7 +16268,7 @@
               <a:defRPr/>
             </a:pPr>
             <a:r>
-              <a:rPr lang="en-US" sz="700" b="1" dirty="0">
+              <a:rPr lang="en-US" sz="700" b="1">
                 <a:solidFill>
                   <a:srgbClr val="2DAA27"/>
                 </a:solidFill>
@@ -16320,7 +16320,7 @@
               <a:defRPr/>
             </a:pPr>
             <a:r>
-              <a:rPr lang="en-US" sz="700" b="1" dirty="0">
+              <a:rPr lang="en-US" sz="700" b="1">
                 <a:solidFill>
                   <a:srgbClr val="2DAA27"/>
                 </a:solidFill>
@@ -19579,35 +19579,35 @@
           <a:p>
             <a:pPr lvl="0"/>
             <a:r>
-              <a:rPr lang="en-US" dirty="0"/>
+              <a:rPr lang="en-US"/>
               <a:t>Click to edit Master text styles</a:t>
             </a:r>
           </a:p>
           <a:p>
             <a:pPr lvl="1"/>
             <a:r>
-              <a:rPr lang="en-US" dirty="0"/>
+              <a:rPr lang="en-US"/>
               <a:t>Second level</a:t>
             </a:r>
           </a:p>
           <a:p>
             <a:pPr lvl="2"/>
             <a:r>
-              <a:rPr lang="en-US" dirty="0"/>
+              <a:rPr lang="en-US"/>
               <a:t>Third level</a:t>
             </a:r>
           </a:p>
           <a:p>
             <a:pPr lvl="3"/>
             <a:r>
-              <a:rPr lang="en-US" dirty="0"/>
+              <a:rPr lang="en-US"/>
               <a:t>Fourth level</a:t>
             </a:r>
           </a:p>
           <a:p>
             <a:pPr lvl="4"/>
             <a:r>
-              <a:rPr lang="en-US" dirty="0"/>
+              <a:rPr lang="en-US"/>
               <a:t>Fifth level</a:t>
             </a:r>
           </a:p>
@@ -19653,7 +19653,7 @@
               <a:defRPr/>
             </a:pPr>
             <a:r>
-              <a:rPr lang="en-US" sz="700" b="1" dirty="0">
+              <a:rPr lang="en-US" sz="700" b="1">
                 <a:solidFill>
                   <a:srgbClr val="2DAA27"/>
                 </a:solidFill>
@@ -19705,7 +19705,7 @@
               <a:defRPr/>
             </a:pPr>
             <a:r>
-              <a:rPr lang="en-US" sz="700" b="1" dirty="0">
+              <a:rPr lang="en-US" sz="700" b="1">
                 <a:solidFill>
                   <a:srgbClr val="2DAA27"/>
                 </a:solidFill>
@@ -20606,12 +20606,12 @@
           <a:lstStyle/>
           <a:p>
             <a:r>
-              <a:rPr lang="en-US" dirty="0">
+              <a:rPr lang="en-US">
                 <a:cs typeface="Arial"/>
               </a:rPr>
               <a:t>Recursion</a:t>
             </a:r>
-            <a:endParaRPr lang="en-US" dirty="0"/>
+            <a:endParaRPr lang="en-US"/>
           </a:p>
         </p:txBody>
       </p:sp>
@@ -20637,7 +20637,7 @@
           <a:lstStyle/>
           <a:p>
             <a:r>
-              <a:rPr lang="en-US" dirty="0">
+              <a:rPr lang="en-US">
                 <a:cs typeface="Arial"/>
               </a:rPr>
               <a:t>AI2C Tech Intro</a:t>
@@ -20667,12 +20667,12 @@
           <a:lstStyle/>
           <a:p>
             <a:r>
-              <a:rPr lang="en-US" dirty="0">
+              <a:rPr lang="en-US">
                 <a:cs typeface="Arial"/>
               </a:rPr>
               <a:t>Jul 2026</a:t>
             </a:r>
-            <a:endParaRPr lang="en-US" dirty="0"/>
+            <a:endParaRPr lang="en-US"/>
           </a:p>
         </p:txBody>
       </p:sp>
@@ -20742,7 +20742,7 @@
           <a:lstStyle/>
           <a:p>
             <a:r>
-              <a:rPr lang="en-US" dirty="0">
+              <a:rPr lang="en-US">
                 <a:solidFill>
                   <a:schemeClr val="bg2"/>
                 </a:solidFill>
@@ -20751,7 +20751,7 @@
               </a:rPr>
               <a:t>Multiple Recursion </a:t>
             </a:r>
-            <a:endParaRPr lang="en-US" dirty="0"/>
+            <a:endParaRPr lang="en-US"/>
           </a:p>
         </p:txBody>
       </p:sp>
@@ -20779,7 +20779,7 @@
           <a:lstStyle/>
           <a:p>
             <a:r>
-              <a:rPr lang="en-US" sz="2800" dirty="0">
+              <a:rPr lang="en-US" sz="2800">
                 <a:solidFill>
                   <a:schemeClr val="bg2"/>
                 </a:solidFill>
@@ -20787,199 +20787,6 @@
                 <a:cs typeface="+mn-lt"/>
               </a:rPr>
               <a:t>A function that calls itself multiple times </a:t>
-            </a:r>
-            <a:endParaRPr lang="en-US" sz="2800" dirty="0">
-              <a:solidFill>
-                <a:schemeClr val="bg2"/>
-              </a:solidFill>
-              <a:cs typeface="Arial"/>
-            </a:endParaRPr>
-          </a:p>
-          <a:p>
-            <a:r>
-              <a:rPr lang="en-US" sz="2800" dirty="0">
-                <a:solidFill>
-                  <a:schemeClr val="bg2"/>
-                </a:solidFill>
-                <a:ea typeface="+mn-lt"/>
-                <a:cs typeface="+mn-lt"/>
-              </a:rPr>
-              <a:t>What is(are) the base case(s)? </a:t>
-            </a:r>
-            <a:endParaRPr lang="en-US" sz="2800" dirty="0">
-              <a:solidFill>
-                <a:schemeClr val="bg2"/>
-              </a:solidFill>
-              <a:cs typeface="Arial"/>
-            </a:endParaRPr>
-          </a:p>
-          <a:p>
-            <a:r>
-              <a:rPr lang="en-US" sz="2800" dirty="0">
-                <a:solidFill>
-                  <a:schemeClr val="bg2"/>
-                </a:solidFill>
-                <a:ea typeface="+mn-lt"/>
-                <a:cs typeface="+mn-lt"/>
-              </a:rPr>
-              <a:t>What is(are) the recursive step(s)? </a:t>
-            </a:r>
-            <a:endParaRPr lang="en-US" sz="2800" dirty="0">
-              <a:solidFill>
-                <a:schemeClr val="bg2"/>
-              </a:solidFill>
-              <a:cs typeface="Arial"/>
-            </a:endParaRPr>
-          </a:p>
-        </p:txBody>
-      </p:sp>
-      <p:sp>
-        <p:nvSpPr>
-          <p:cNvPr id="8" name="Content Placeholder 7">
-            <a:extLst>
-              <a:ext uri="{FF2B5EF4-FFF2-40B4-BE49-F238E27FC236}">
-                <a16:creationId xmlns:a16="http://schemas.microsoft.com/office/drawing/2014/main" id="{B74402D1-7E61-5EB4-A56D-7953EBCF7CDD}"/>
-              </a:ext>
-            </a:extLst>
-          </p:cNvPr>
-          <p:cNvSpPr>
-            <a:spLocks noGrp="1"/>
-          </p:cNvSpPr>
-          <p:nvPr>
-            <p:ph sz="half" idx="2"/>
-          </p:nvPr>
-        </p:nvSpPr>
-        <p:spPr/>
-        <p:txBody>
-          <a:bodyPr vert="horz" lIns="0" tIns="0" rIns="0" bIns="0" spcCol="365760" rtlCol="0" anchor="t">
-            <a:noAutofit/>
-          </a:bodyPr>
-          <a:lstStyle/>
-          <a:p>
-            <a:pPr marL="0" indent="0">
-              <a:buNone/>
-            </a:pPr>
-            <a:r>
-              <a:rPr lang="en-US" sz="2800" dirty="0">
-                <a:solidFill>
-                  <a:schemeClr val="bg2"/>
-                </a:solidFill>
-                <a:ea typeface="+mn-lt"/>
-                <a:cs typeface="+mn-lt"/>
-              </a:rPr>
-              <a:t>def fib(n: int) -&gt; int: </a:t>
-            </a:r>
-            <a:endParaRPr lang="en-US" dirty="0"/>
-          </a:p>
-          <a:p>
-            <a:pPr marL="0" indent="0">
-              <a:buNone/>
-            </a:pPr>
-            <a:r>
-              <a:rPr lang="en-US" sz="2800" dirty="0">
-                <a:solidFill>
-                  <a:schemeClr val="bg2"/>
-                </a:solidFill>
-                <a:ea typeface="+mn-lt"/>
-                <a:cs typeface="+mn-lt"/>
-              </a:rPr>
-              <a:t>    if n == 0: </a:t>
-            </a:r>
-            <a:endParaRPr lang="en-US" sz="2800" dirty="0">
-              <a:solidFill>
-                <a:schemeClr val="bg2"/>
-              </a:solidFill>
-              <a:cs typeface="Arial"/>
-            </a:endParaRPr>
-          </a:p>
-          <a:p>
-            <a:pPr marL="0" indent="0">
-              <a:buNone/>
-            </a:pPr>
-            <a:r>
-              <a:rPr lang="en-US" sz="2800" dirty="0">
-                <a:solidFill>
-                  <a:schemeClr val="bg2"/>
-                </a:solidFill>
-                <a:ea typeface="+mn-lt"/>
-                <a:cs typeface="+mn-lt"/>
-              </a:rPr>
-              <a:t>        return 0 </a:t>
-            </a:r>
-            <a:endParaRPr lang="en-US" sz="2800" dirty="0">
-              <a:solidFill>
-                <a:schemeClr val="bg2"/>
-              </a:solidFill>
-              <a:cs typeface="Arial"/>
-            </a:endParaRPr>
-          </a:p>
-          <a:p>
-            <a:pPr marL="0" indent="0">
-              <a:buNone/>
-            </a:pPr>
-            <a:r>
-              <a:rPr lang="en-US" sz="2800" dirty="0">
-                <a:solidFill>
-                  <a:schemeClr val="bg2"/>
-                </a:solidFill>
-                <a:ea typeface="+mn-lt"/>
-                <a:cs typeface="+mn-lt"/>
-              </a:rPr>
-              <a:t>    if n == 1: </a:t>
-            </a:r>
-            <a:endParaRPr lang="en-US" sz="2800" dirty="0">
-              <a:solidFill>
-                <a:schemeClr val="bg2"/>
-              </a:solidFill>
-              <a:cs typeface="Arial"/>
-            </a:endParaRPr>
-          </a:p>
-          <a:p>
-            <a:pPr marL="0" indent="0">
-              <a:buNone/>
-            </a:pPr>
-            <a:r>
-              <a:rPr lang="en-US" sz="2800" dirty="0">
-                <a:solidFill>
-                  <a:schemeClr val="bg2"/>
-                </a:solidFill>
-                <a:ea typeface="+mn-lt"/>
-                <a:cs typeface="+mn-lt"/>
-              </a:rPr>
-              <a:t>        return 1 </a:t>
-            </a:r>
-            <a:endParaRPr lang="en-US" sz="2800" dirty="0">
-              <a:solidFill>
-                <a:schemeClr val="bg2"/>
-              </a:solidFill>
-              <a:cs typeface="Arial"/>
-            </a:endParaRPr>
-          </a:p>
-          <a:p>
-            <a:pPr marL="0" indent="0">
-              <a:buNone/>
-            </a:pPr>
-            <a:endParaRPr lang="en-US" sz="2800" dirty="0">
-              <a:solidFill>
-                <a:schemeClr val="bg2"/>
-              </a:solidFill>
-              <a:ea typeface="+mn-lt"/>
-              <a:cs typeface="+mn-lt"/>
-            </a:endParaRPr>
-          </a:p>
-          <a:p>
-            <a:pPr marL="0" indent="0">
-              <a:buNone/>
-            </a:pPr>
-            <a:r>
-              <a:rPr lang="en-US" sz="2800" dirty="0">
-                <a:solidFill>
-                  <a:schemeClr val="bg2"/>
-                </a:solidFill>
-                <a:ea typeface="+mn-lt"/>
-                <a:cs typeface="+mn-lt"/>
-              </a:rPr>
-              <a:t>    return fib(n-1) + fib(n-2) </a:t>
             </a:r>
             <a:endParaRPr lang="en-US" sz="2800">
               <a:solidFill>
@@ -20989,15 +20796,233 @@
             </a:endParaRPr>
           </a:p>
           <a:p>
-            <a:endParaRPr lang="en-US" sz="2800" dirty="0">
+            <a:r>
+              <a:rPr lang="en-US" sz="2800">
+                <a:solidFill>
+                  <a:schemeClr val="bg2"/>
+                </a:solidFill>
+                <a:ea typeface="+mn-lt"/>
+                <a:cs typeface="+mn-lt"/>
+              </a:rPr>
+              <a:t>What is(are) the base case(s)? </a:t>
+            </a:r>
+            <a:endParaRPr lang="en-US" sz="2800">
+              <a:solidFill>
+                <a:schemeClr val="bg2"/>
+              </a:solidFill>
               <a:cs typeface="Arial"/>
             </a:endParaRPr>
           </a:p>
           <a:p>
+            <a:r>
+              <a:rPr lang="en-US" sz="2800">
+                <a:solidFill>
+                  <a:schemeClr val="bg2"/>
+                </a:solidFill>
+                <a:ea typeface="+mn-lt"/>
+                <a:cs typeface="+mn-lt"/>
+              </a:rPr>
+              <a:t>What is(are) the recursive step(s)? </a:t>
+            </a:r>
+            <a:endParaRPr lang="en-US" sz="2800">
+              <a:solidFill>
+                <a:schemeClr val="bg2"/>
+              </a:solidFill>
+              <a:cs typeface="Arial"/>
+            </a:endParaRPr>
+          </a:p>
+        </p:txBody>
+      </p:sp>
+      <p:sp>
+        <p:nvSpPr>
+          <p:cNvPr id="8" name="Content Placeholder 7">
+            <a:extLst>
+              <a:ext uri="{FF2B5EF4-FFF2-40B4-BE49-F238E27FC236}">
+                <a16:creationId xmlns:a16="http://schemas.microsoft.com/office/drawing/2014/main" id="{B74402D1-7E61-5EB4-A56D-7953EBCF7CDD}"/>
+              </a:ext>
+            </a:extLst>
+          </p:cNvPr>
+          <p:cNvSpPr>
+            <a:spLocks noGrp="1"/>
+          </p:cNvSpPr>
+          <p:nvPr>
+            <p:ph sz="half" idx="2"/>
+          </p:nvPr>
+        </p:nvSpPr>
+        <p:spPr>
+          <a:xfrm>
+            <a:off x="5779638" y="1600199"/>
+            <a:ext cx="6415512" cy="4466898"/>
+          </a:xfrm>
+        </p:spPr>
+        <p:txBody>
+          <a:bodyPr vert="horz" lIns="0" tIns="0" rIns="0" bIns="0" spcCol="365760" rtlCol="0" anchor="t">
+            <a:noAutofit/>
+          </a:bodyPr>
+          <a:lstStyle/>
+          <a:p>
+            <a:pPr marL="0" indent="0">
+              <a:buNone/>
+            </a:pPr>
+            <a:r>
+              <a:rPr lang="en-US" sz="2800" dirty="0">
+                <a:solidFill>
+                  <a:schemeClr val="bg2"/>
+                </a:solidFill>
+                <a:latin typeface="Courier New"/>
+                <a:ea typeface="+mn-lt"/>
+                <a:cs typeface="+mn-lt"/>
+              </a:rPr>
+              <a:t>def fib(n: int) -&gt; int: </a:t>
+            </a:r>
+            <a:endParaRPr lang="en-US" dirty="0">
+              <a:solidFill>
+                <a:schemeClr val="bg2"/>
+              </a:solidFill>
+              <a:latin typeface="Courier New"/>
+              <a:cs typeface="Courier New"/>
+            </a:endParaRPr>
+          </a:p>
+          <a:p>
+            <a:pPr marL="0" indent="0">
+              <a:buNone/>
+            </a:pPr>
+            <a:r>
+              <a:rPr lang="en-US" sz="2800" dirty="0">
+                <a:solidFill>
+                  <a:schemeClr val="bg2"/>
+                </a:solidFill>
+                <a:latin typeface="Courier New"/>
+                <a:ea typeface="+mn-lt"/>
+                <a:cs typeface="+mn-lt"/>
+              </a:rPr>
+              <a:t>    if n == 0: </a:t>
+            </a:r>
+            <a:endParaRPr lang="en-US" sz="2800" dirty="0">
+              <a:solidFill>
+                <a:schemeClr val="bg2"/>
+              </a:solidFill>
+              <a:latin typeface="Courier New"/>
+              <a:cs typeface="Arial"/>
+            </a:endParaRPr>
+          </a:p>
+          <a:p>
+            <a:pPr marL="0" indent="0">
+              <a:buNone/>
+            </a:pPr>
+            <a:r>
+              <a:rPr lang="en-US" sz="2800" dirty="0">
+                <a:solidFill>
+                  <a:schemeClr val="bg2"/>
+                </a:solidFill>
+                <a:latin typeface="Courier New"/>
+                <a:ea typeface="+mn-lt"/>
+                <a:cs typeface="+mn-lt"/>
+              </a:rPr>
+              <a:t>        return 0 </a:t>
+            </a:r>
+            <a:endParaRPr lang="en-US" sz="2800" dirty="0">
+              <a:solidFill>
+                <a:schemeClr val="bg2"/>
+              </a:solidFill>
+              <a:latin typeface="Courier New"/>
+              <a:cs typeface="Arial"/>
+            </a:endParaRPr>
+          </a:p>
+          <a:p>
+            <a:pPr marL="0" indent="0">
+              <a:buNone/>
+            </a:pPr>
+            <a:r>
+              <a:rPr lang="en-US" sz="2800" dirty="0">
+                <a:solidFill>
+                  <a:schemeClr val="bg2"/>
+                </a:solidFill>
+                <a:latin typeface="Courier New"/>
+                <a:ea typeface="+mn-lt"/>
+                <a:cs typeface="+mn-lt"/>
+              </a:rPr>
+              <a:t>    if n == 1: </a:t>
+            </a:r>
+            <a:endParaRPr lang="en-US" sz="2800" dirty="0">
+              <a:solidFill>
+                <a:schemeClr val="bg2"/>
+              </a:solidFill>
+              <a:latin typeface="Courier New"/>
+              <a:cs typeface="Arial"/>
+            </a:endParaRPr>
+          </a:p>
+          <a:p>
+            <a:pPr marL="0" indent="0">
+              <a:buNone/>
+            </a:pPr>
+            <a:r>
+              <a:rPr lang="en-US" sz="2800" dirty="0">
+                <a:solidFill>
+                  <a:schemeClr val="bg2"/>
+                </a:solidFill>
+                <a:latin typeface="Courier New"/>
+                <a:ea typeface="+mn-lt"/>
+                <a:cs typeface="+mn-lt"/>
+              </a:rPr>
+              <a:t>        return 1 </a:t>
+            </a:r>
+            <a:endParaRPr lang="en-US" sz="2800" dirty="0">
+              <a:solidFill>
+                <a:schemeClr val="bg2"/>
+              </a:solidFill>
+              <a:latin typeface="Courier New"/>
+              <a:cs typeface="Arial"/>
+            </a:endParaRPr>
+          </a:p>
+          <a:p>
             <a:pPr marL="0" indent="0">
               <a:buNone/>
             </a:pPr>
             <a:endParaRPr lang="en-US" sz="2800" dirty="0">
+              <a:solidFill>
+                <a:schemeClr val="bg2"/>
+              </a:solidFill>
+              <a:latin typeface="Courier New"/>
+              <a:ea typeface="+mn-lt"/>
+              <a:cs typeface="+mn-lt"/>
+            </a:endParaRPr>
+          </a:p>
+          <a:p>
+            <a:pPr marL="0" indent="0">
+              <a:buNone/>
+            </a:pPr>
+            <a:r>
+              <a:rPr lang="en-US" sz="2800" dirty="0">
+                <a:solidFill>
+                  <a:schemeClr val="bg2"/>
+                </a:solidFill>
+                <a:latin typeface="Courier New"/>
+                <a:ea typeface="+mn-lt"/>
+                <a:cs typeface="+mn-lt"/>
+              </a:rPr>
+              <a:t>    return fib(n-1) + fib(n-2) </a:t>
+            </a:r>
+            <a:endParaRPr lang="en-US" sz="2800" dirty="0">
+              <a:solidFill>
+                <a:schemeClr val="bg2"/>
+              </a:solidFill>
+              <a:latin typeface="Courier New"/>
+              <a:cs typeface="Arial"/>
+            </a:endParaRPr>
+          </a:p>
+          <a:p>
+            <a:endParaRPr lang="en-US" sz="2800" dirty="0">
+              <a:latin typeface="Courier New"/>
+              <a:cs typeface="Arial"/>
+            </a:endParaRPr>
+          </a:p>
+          <a:p>
+            <a:pPr marL="0" indent="0">
+              <a:buNone/>
+            </a:pPr>
+            <a:endParaRPr lang="en-US" sz="2800" dirty="0">
+              <a:latin typeface="Courier New"/>
               <a:cs typeface="Arial"/>
             </a:endParaRPr>
           </a:p>
@@ -21128,7 +21153,7 @@
           <a:lstStyle/>
           <a:p>
             <a:r>
-              <a:rPr lang="en-US" dirty="0">
+              <a:rPr lang="en-US">
                 <a:solidFill>
                   <a:schemeClr val="bg2"/>
                 </a:solidFill>
@@ -21158,8 +21183,8 @@
         </p:nvSpPr>
         <p:spPr>
           <a:xfrm>
-            <a:off x="548640" y="1679025"/>
-            <a:ext cx="10697101" cy="4493173"/>
+            <a:off x="23124" y="1705300"/>
+            <a:ext cx="12155410" cy="4466898"/>
           </a:xfrm>
         </p:spPr>
         <p:txBody>
@@ -21172,59 +21197,66 @@
               <a:buNone/>
             </a:pPr>
             <a:r>
-              <a:rPr lang="en-US" sz="2800" dirty="0">
+              <a:rPr lang="en-US" sz="2400" dirty="0">
                 <a:solidFill>
                   <a:schemeClr val="bg2"/>
                 </a:solidFill>
+                <a:latin typeface="Courier New"/>
                 <a:ea typeface="+mn-lt"/>
                 <a:cs typeface="+mn-lt"/>
               </a:rPr>
               <a:t>def </a:t>
             </a:r>
             <a:r>
-              <a:rPr lang="en-US" sz="2800" dirty="0" err="1">
+              <a:rPr lang="en-US" sz="2400" err="1">
                 <a:solidFill>
                   <a:schemeClr val="bg2"/>
                 </a:solidFill>
+                <a:latin typeface="Courier New"/>
                 <a:ea typeface="+mn-lt"/>
                 <a:cs typeface="+mn-lt"/>
               </a:rPr>
               <a:t>re_sum_half</a:t>
             </a:r>
             <a:r>
-              <a:rPr lang="en-US" sz="2800" dirty="0">
+              <a:rPr lang="en-US" sz="2400" dirty="0">
                 <a:solidFill>
                   <a:schemeClr val="bg2"/>
                 </a:solidFill>
+                <a:latin typeface="Courier New"/>
                 <a:ea typeface="+mn-lt"/>
                 <a:cs typeface="+mn-lt"/>
               </a:rPr>
               <a:t>(</a:t>
             </a:r>
             <a:r>
-              <a:rPr lang="en-US" sz="2800" dirty="0" err="1">
+              <a:rPr lang="en-US" sz="2400" err="1">
                 <a:solidFill>
                   <a:schemeClr val="bg2"/>
                 </a:solidFill>
+                <a:latin typeface="Courier New"/>
                 <a:ea typeface="+mn-lt"/>
                 <a:cs typeface="+mn-lt"/>
               </a:rPr>
               <a:t>num_list</a:t>
             </a:r>
             <a:r>
-              <a:rPr lang="en-US" sz="2800" dirty="0">
+              <a:rPr lang="en-US" sz="2400" dirty="0">
                 <a:solidFill>
                   <a:schemeClr val="bg2"/>
                 </a:solidFill>
+                <a:latin typeface="Courier New"/>
                 <a:ea typeface="+mn-lt"/>
                 <a:cs typeface="+mn-lt"/>
               </a:rPr>
               <a:t>: list[int]) -&gt; int: </a:t>
             </a:r>
-            <a:endParaRPr lang="en-US" dirty="0">
+            <a:endParaRPr lang="en-US" sz="2400">
               <a:solidFill>
                 <a:schemeClr val="bg2"/>
               </a:solidFill>
+              <a:latin typeface="Courier New"/>
+              <a:cs typeface="Courier New"/>
             </a:endParaRPr>
           </a:p>
           <a:p>
@@ -21232,59 +21264,65 @@
               <a:buNone/>
             </a:pPr>
             <a:r>
-              <a:rPr lang="en-US" sz="2800" dirty="0">
+              <a:rPr lang="en-US" sz="2400" dirty="0">
                 <a:solidFill>
                   <a:schemeClr val="bg2"/>
                 </a:solidFill>
+                <a:latin typeface="Courier New"/>
                 <a:ea typeface="+mn-lt"/>
                 <a:cs typeface="+mn-lt"/>
               </a:rPr>
               <a:t>    if </a:t>
             </a:r>
             <a:r>
-              <a:rPr lang="en-US" sz="2800" dirty="0" err="1">
+              <a:rPr lang="en-US" sz="2400" err="1">
                 <a:solidFill>
                   <a:schemeClr val="bg2"/>
                 </a:solidFill>
+                <a:latin typeface="Courier New"/>
                 <a:ea typeface="+mn-lt"/>
                 <a:cs typeface="+mn-lt"/>
               </a:rPr>
               <a:t>len</a:t>
             </a:r>
             <a:r>
-              <a:rPr lang="en-US" sz="2800" dirty="0">
+              <a:rPr lang="en-US" sz="2400" dirty="0">
                 <a:solidFill>
                   <a:schemeClr val="bg2"/>
                 </a:solidFill>
+                <a:latin typeface="Courier New"/>
                 <a:ea typeface="+mn-lt"/>
                 <a:cs typeface="+mn-lt"/>
               </a:rPr>
               <a:t>(</a:t>
             </a:r>
             <a:r>
-              <a:rPr lang="en-US" sz="2800" dirty="0" err="1">
+              <a:rPr lang="en-US" sz="2400" err="1">
                 <a:solidFill>
                   <a:schemeClr val="bg2"/>
                 </a:solidFill>
+                <a:latin typeface="Courier New"/>
                 <a:ea typeface="+mn-lt"/>
                 <a:cs typeface="+mn-lt"/>
               </a:rPr>
               <a:t>num_list</a:t>
             </a:r>
             <a:r>
-              <a:rPr lang="en-US" sz="2800" dirty="0">
+              <a:rPr lang="en-US" sz="2400" dirty="0">
                 <a:solidFill>
                   <a:schemeClr val="bg2"/>
                 </a:solidFill>
+                <a:latin typeface="Courier New"/>
                 <a:ea typeface="+mn-lt"/>
                 <a:cs typeface="+mn-lt"/>
               </a:rPr>
               <a:t>) == 1: </a:t>
             </a:r>
-            <a:endParaRPr lang="en-US" dirty="0">
+            <a:endParaRPr lang="en-US" sz="2400">
               <a:solidFill>
                 <a:schemeClr val="bg2"/>
               </a:solidFill>
+              <a:latin typeface="Courier New"/>
               <a:cs typeface="Arial"/>
             </a:endParaRPr>
           </a:p>
@@ -21293,103 +21331,116 @@
               <a:buNone/>
             </a:pPr>
             <a:r>
-              <a:rPr lang="en-US" sz="2800" dirty="0">
+              <a:rPr lang="en-US" sz="2400" dirty="0">
                 <a:solidFill>
                   <a:schemeClr val="bg2"/>
                 </a:solidFill>
+                <a:latin typeface="Courier New"/>
                 <a:ea typeface="+mn-lt"/>
                 <a:cs typeface="+mn-lt"/>
               </a:rPr>
               <a:t>        return </a:t>
             </a:r>
             <a:r>
-              <a:rPr lang="en-US" sz="2800" dirty="0" err="1">
+              <a:rPr lang="en-US" sz="2400" err="1">
                 <a:solidFill>
                   <a:schemeClr val="bg2"/>
                 </a:solidFill>
+                <a:latin typeface="Courier New"/>
                 <a:ea typeface="+mn-lt"/>
                 <a:cs typeface="+mn-lt"/>
               </a:rPr>
               <a:t>num_list</a:t>
             </a:r>
             <a:r>
-              <a:rPr lang="en-US" sz="2800" dirty="0">
+              <a:rPr lang="en-US" sz="2400" dirty="0">
                 <a:solidFill>
                   <a:schemeClr val="bg2"/>
                 </a:solidFill>
+                <a:latin typeface="Courier New"/>
                 <a:ea typeface="+mn-lt"/>
                 <a:cs typeface="+mn-lt"/>
               </a:rPr>
               <a:t>[0] </a:t>
             </a:r>
-            <a:endParaRPr lang="en-US" dirty="0">
+            <a:endParaRPr lang="en-US" sz="2400">
               <a:solidFill>
                 <a:schemeClr val="bg2"/>
               </a:solidFill>
+              <a:latin typeface="Courier New"/>
               <a:cs typeface="Arial"/>
             </a:endParaRPr>
           </a:p>
           <a:p>
-            <a:endParaRPr lang="en-US"/>
+            <a:endParaRPr lang="en-US" sz="1600" dirty="0">
+              <a:latin typeface="Courier New"/>
+              <a:cs typeface="Courier New"/>
+            </a:endParaRPr>
           </a:p>
           <a:p>
             <a:pPr marL="0" indent="0">
               <a:buNone/>
             </a:pPr>
             <a:r>
-              <a:rPr lang="en-US" sz="2800" dirty="0">
+              <a:rPr lang="en-US" sz="2400" dirty="0">
                 <a:solidFill>
                   <a:schemeClr val="bg2"/>
                 </a:solidFill>
+                <a:latin typeface="Courier New"/>
                 <a:ea typeface="+mn-lt"/>
                 <a:cs typeface="+mn-lt"/>
               </a:rPr>
               <a:t>    half = </a:t>
             </a:r>
             <a:r>
-              <a:rPr lang="en-US" sz="2800" dirty="0" err="1">
+              <a:rPr lang="en-US" sz="2400" err="1">
                 <a:solidFill>
                   <a:schemeClr val="bg2"/>
                 </a:solidFill>
+                <a:latin typeface="Courier New"/>
                 <a:ea typeface="+mn-lt"/>
                 <a:cs typeface="+mn-lt"/>
               </a:rPr>
               <a:t>len</a:t>
             </a:r>
             <a:r>
-              <a:rPr lang="en-US" sz="2800" dirty="0">
+              <a:rPr lang="en-US" sz="2400" dirty="0">
                 <a:solidFill>
                   <a:schemeClr val="bg2"/>
                 </a:solidFill>
+                <a:latin typeface="Courier New"/>
                 <a:ea typeface="+mn-lt"/>
                 <a:cs typeface="+mn-lt"/>
               </a:rPr>
               <a:t>(</a:t>
             </a:r>
             <a:r>
-              <a:rPr lang="en-US" sz="2800" dirty="0" err="1">
+              <a:rPr lang="en-US" sz="2400" err="1">
                 <a:solidFill>
                   <a:schemeClr val="bg2"/>
                 </a:solidFill>
+                <a:latin typeface="Courier New"/>
                 <a:ea typeface="+mn-lt"/>
                 <a:cs typeface="+mn-lt"/>
               </a:rPr>
               <a:t>num_list</a:t>
             </a:r>
             <a:r>
-              <a:rPr lang="en-US" sz="2800" dirty="0">
+              <a:rPr lang="en-US" sz="2400" dirty="0">
                 <a:solidFill>
                   <a:schemeClr val="bg2"/>
                 </a:solidFill>
+                <a:latin typeface="Courier New"/>
                 <a:ea typeface="+mn-lt"/>
                 <a:cs typeface="+mn-lt"/>
               </a:rPr>
               <a:t>) // 2 </a:t>
             </a:r>
-            <a:endParaRPr lang="en-US" dirty="0">
+            <a:endParaRPr lang="en-US" sz="2400">
               <a:solidFill>
                 <a:schemeClr val="bg2"/>
               </a:solidFill>
+              <a:latin typeface="Courier New"/>
               <a:cs typeface="Arial"/>
             </a:endParaRPr>
           </a:p>
@@ -21398,107 +21449,139 @@
               <a:buNone/>
             </a:pPr>
             <a:r>
-              <a:rPr lang="en-US" sz="2800" dirty="0">
+              <a:rPr lang="en-US" sz="2400" dirty="0">
                 <a:solidFill>
                   <a:schemeClr val="bg2"/>
                 </a:solidFill>
+                <a:latin typeface="Courier New"/>
                 <a:ea typeface="+mn-lt"/>
                 <a:cs typeface="+mn-lt"/>
               </a:rPr>
-              <a:t>    return </a:t>
-            </a:r>
-            <a:r>
-              <a:rPr lang="en-US" sz="2800" err="1">
+              <a:t>    return </a:t>
+            </a:r>
+            <a:r>
+              <a:rPr lang="en-US" sz="2400" dirty="0" err="1">
                 <a:solidFill>
                   <a:schemeClr val="bg2"/>
                 </a:solidFill>
+                <a:latin typeface="Courier New"/>
                 <a:ea typeface="+mn-lt"/>
                 <a:cs typeface="+mn-lt"/>
               </a:rPr>
               <a:t>re_sum_half</a:t>
             </a:r>
             <a:r>
-              <a:rPr lang="en-US" sz="2800" dirty="0">
+              <a:rPr lang="en-US" sz="2400" dirty="0">
                 <a:solidFill>
                   <a:schemeClr val="bg2"/>
                 </a:solidFill>
+                <a:latin typeface="Courier New"/>
                 <a:ea typeface="+mn-lt"/>
                 <a:cs typeface="+mn-lt"/>
               </a:rPr>
               <a:t>(</a:t>
             </a:r>
             <a:r>
-              <a:rPr lang="en-US" sz="2800" err="1">
+              <a:rPr lang="en-US" sz="2400" dirty="0" err="1">
                 <a:solidFill>
                   <a:schemeClr val="bg2"/>
                 </a:solidFill>
+                <a:latin typeface="Courier New"/>
                 <a:ea typeface="+mn-lt"/>
                 <a:cs typeface="+mn-lt"/>
               </a:rPr>
               <a:t>num_list</a:t>
             </a:r>
             <a:r>
-              <a:rPr lang="en-US" sz="2800" dirty="0">
+              <a:rPr lang="en-US" sz="2400" dirty="0">
                 <a:solidFill>
                   <a:schemeClr val="bg2"/>
                 </a:solidFill>
+                <a:latin typeface="Courier New"/>
                 <a:ea typeface="+mn-lt"/>
                 <a:cs typeface="+mn-lt"/>
               </a:rPr>
-              <a:t>[:half]) + </a:t>
-            </a:r>
-            <a:r>
-              <a:rPr lang="en-US" sz="2800" err="1">
+              <a:t>[:half]) + </a:t>
+            </a:r>
+          </a:p>
+          <a:p>
+            <a:pPr marL="0" indent="0">
+              <a:buNone/>
+            </a:pPr>
+            <a:r>
+              <a:rPr lang="en-US" sz="2400" dirty="0">
                 <a:solidFill>
                   <a:schemeClr val="bg2"/>
                 </a:solidFill>
+                <a:latin typeface="Courier New"/>
+                <a:ea typeface="+mn-lt"/>
+                <a:cs typeface="+mn-lt"/>
+              </a:rPr>
+              <a:t>        </a:t>
+            </a:r>
+            <a:r>
+              <a:rPr lang="en-US" sz="2400" dirty="0" err="1">
+                <a:solidFill>
+                  <a:schemeClr val="bg2"/>
+                </a:solidFill>
+                <a:latin typeface="Courier New"/>
                 <a:ea typeface="+mn-lt"/>
                 <a:cs typeface="+mn-lt"/>
               </a:rPr>
               <a:t>re_sum_half</a:t>
             </a:r>
             <a:r>
-              <a:rPr lang="en-US" sz="2800" dirty="0">
+              <a:rPr lang="en-US" sz="2400" dirty="0">
                 <a:solidFill>
                   <a:schemeClr val="bg2"/>
                 </a:solidFill>
+                <a:latin typeface="Courier New"/>
                 <a:ea typeface="+mn-lt"/>
                 <a:cs typeface="+mn-lt"/>
               </a:rPr>
               <a:t>(</a:t>
             </a:r>
             <a:r>
-              <a:rPr lang="en-US" sz="2800" err="1">
+              <a:rPr lang="en-US" sz="2400" dirty="0" err="1">
                 <a:solidFill>
                   <a:schemeClr val="bg2"/>
                 </a:solidFill>
+                <a:latin typeface="Courier New"/>
                 <a:ea typeface="+mn-lt"/>
                 <a:cs typeface="+mn-lt"/>
               </a:rPr>
               <a:t>num_list</a:t>
             </a:r>
             <a:r>
-              <a:rPr lang="en-US" sz="2800" dirty="0">
+              <a:rPr lang="en-US" sz="2400" dirty="0">
                 <a:solidFill>
                   <a:schemeClr val="bg2"/>
                 </a:solidFill>
+                <a:latin typeface="Courier New"/>
                 <a:ea typeface="+mn-lt"/>
                 <a:cs typeface="+mn-lt"/>
               </a:rPr>
-              <a:t>[half:]) </a:t>
-            </a:r>
-            <a:endParaRPr lang="en-US" dirty="0">
+              <a:t>[half:])</a:t>
+            </a:r>
+            <a:endParaRPr lang="en-US" sz="2400" dirty="0">
               <a:solidFill>
                 <a:schemeClr val="bg2"/>
               </a:solidFill>
+              <a:latin typeface="Courier New"/>
               <a:cs typeface="Arial"/>
             </a:endParaRPr>
           </a:p>
           <a:p>
-            <a:endParaRPr lang="en-US"/>
-          </a:p>
-          <a:p>
-            <a:endParaRPr lang="en-US"/>
+            <a:endParaRPr lang="en-US" sz="1600" dirty="0">
+              <a:latin typeface="Courier New"/>
+              <a:cs typeface="Courier New"/>
+            </a:endParaRPr>
+          </a:p>
+          <a:p>
+            <a:endParaRPr lang="en-US" sz="1600" dirty="0">
+              <a:latin typeface="Courier New"/>
+              <a:cs typeface="Courier New"/>
+            </a:endParaRPr>
           </a:p>
         </p:txBody>
       </p:sp>
@@ -21627,7 +21710,7 @@
           <a:lstStyle/>
           <a:p>
             <a:r>
-              <a:rPr lang="en-US" dirty="0">
+              <a:rPr lang="en-US">
                 <a:solidFill>
                   <a:schemeClr val="bg2"/>
                 </a:solidFill>
@@ -21789,7 +21872,7 @@
           <a:lstStyle/>
           <a:p>
             <a:r>
-              <a:rPr lang="en-US" dirty="0">
+              <a:rPr lang="en-US">
                 <a:solidFill>
                   <a:schemeClr val="bg2"/>
                 </a:solidFill>
@@ -21798,7 +21881,7 @@
               </a:rPr>
               <a:t>Binary Search </a:t>
             </a:r>
-            <a:endParaRPr lang="en-US" dirty="0"/>
+            <a:endParaRPr lang="en-US"/>
           </a:p>
         </p:txBody>
       </p:sp>
@@ -21959,7 +22042,7 @@
           <a:lstStyle/>
           <a:p>
             <a:r>
-              <a:rPr lang="en-US" dirty="0">
+              <a:rPr lang="en-US">
                 <a:solidFill>
                   <a:schemeClr val="bg2"/>
                 </a:solidFill>
@@ -21968,7 +22051,7 @@
               </a:rPr>
               <a:t>Binary Search </a:t>
             </a:r>
-            <a:endParaRPr lang="en-US" dirty="0"/>
+            <a:endParaRPr lang="en-US"/>
           </a:p>
         </p:txBody>
       </p:sp>
@@ -22008,16 +22091,18 @@
                 <a:solidFill>
                   <a:schemeClr val="bg2"/>
                 </a:solidFill>
+                <a:latin typeface="Courier New"/>
                 <a:ea typeface="+mn-lt"/>
                 <a:cs typeface="+mn-lt"/>
               </a:rPr>
               <a:t>def </a:t>
             </a:r>
             <a:r>
-              <a:rPr lang="en-US" sz="2000" dirty="0" err="1">
+              <a:rPr lang="en-US" sz="2000" err="1">
                 <a:solidFill>
                   <a:schemeClr val="bg2"/>
                 </a:solidFill>
+                <a:latin typeface="Courier New"/>
                 <a:ea typeface="+mn-lt"/>
                 <a:cs typeface="+mn-lt"/>
               </a:rPr>
@@ -22028,16 +22113,18 @@
                 <a:solidFill>
                   <a:schemeClr val="bg2"/>
                 </a:solidFill>
+                <a:latin typeface="Courier New"/>
                 <a:ea typeface="+mn-lt"/>
                 <a:cs typeface="+mn-lt"/>
               </a:rPr>
               <a:t>(</a:t>
             </a:r>
             <a:r>
-              <a:rPr lang="en-US" sz="2000" dirty="0" err="1">
+              <a:rPr lang="en-US" sz="2000" err="1">
                 <a:solidFill>
                   <a:schemeClr val="bg2"/>
                 </a:solidFill>
+                <a:latin typeface="Courier New"/>
                 <a:ea typeface="+mn-lt"/>
                 <a:cs typeface="+mn-lt"/>
               </a:rPr>
@@ -22048,15 +22135,17 @@
                 <a:solidFill>
                   <a:schemeClr val="bg2"/>
                 </a:solidFill>
+                <a:latin typeface="Courier New"/>
                 <a:ea typeface="+mn-lt"/>
                 <a:cs typeface="+mn-lt"/>
               </a:rPr>
               <a:t>, low, high, x): </a:t>
             </a:r>
-            <a:endParaRPr lang="en-US" sz="2000">
+            <a:endParaRPr lang="en-US" sz="2000" dirty="0">
               <a:solidFill>
                 <a:schemeClr val="bg2"/>
               </a:solidFill>
+              <a:latin typeface="Courier New"/>
               <a:cs typeface="Arial"/>
             </a:endParaRPr>
           </a:p>
@@ -22069,15 +22158,17 @@
                 <a:solidFill>
                   <a:schemeClr val="bg2"/>
                 </a:solidFill>
+                <a:latin typeface="Courier New"/>
                 <a:ea typeface="+mn-lt"/>
                 <a:cs typeface="+mn-lt"/>
               </a:rPr>
               <a:t>    """assumes array is already sorted""" </a:t>
             </a:r>
-            <a:endParaRPr lang="en-US" sz="2000">
+            <a:endParaRPr lang="en-US" sz="2000" dirty="0">
               <a:solidFill>
                 <a:schemeClr val="bg2"/>
               </a:solidFill>
+              <a:latin typeface="Courier New"/>
               <a:cs typeface="Arial"/>
             </a:endParaRPr>
           </a:p>
@@ -22090,15 +22181,17 @@
                 <a:solidFill>
                   <a:schemeClr val="bg2"/>
                 </a:solidFill>
+                <a:latin typeface="Courier New"/>
                 <a:ea typeface="+mn-lt"/>
                 <a:cs typeface="+mn-lt"/>
               </a:rPr>
               <a:t>    if high &gt;= low: </a:t>
             </a:r>
-            <a:endParaRPr lang="en-US" sz="2000">
+            <a:endParaRPr lang="en-US" sz="2000" dirty="0">
               <a:solidFill>
                 <a:schemeClr val="bg2"/>
               </a:solidFill>
+              <a:latin typeface="Courier New"/>
               <a:cs typeface="Arial"/>
             </a:endParaRPr>
           </a:p>
@@ -22111,15 +22204,17 @@
                 <a:solidFill>
                   <a:schemeClr val="bg2"/>
                 </a:solidFill>
+                <a:latin typeface="Courier New"/>
                 <a:ea typeface="+mn-lt"/>
                 <a:cs typeface="+mn-lt"/>
               </a:rPr>
               <a:t>        mid = (high + low) // 2 </a:t>
             </a:r>
-            <a:endParaRPr lang="en-US" sz="2000">
+            <a:endParaRPr lang="en-US" sz="2000" dirty="0">
               <a:solidFill>
                 <a:schemeClr val="bg2"/>
               </a:solidFill>
+              <a:latin typeface="Courier New"/>
               <a:cs typeface="Arial"/>
             </a:endParaRPr>
           </a:p>
@@ -22132,16 +22227,18 @@
                 <a:solidFill>
                   <a:schemeClr val="bg2"/>
                 </a:solidFill>
+                <a:latin typeface="Courier New"/>
                 <a:ea typeface="+mn-lt"/>
                 <a:cs typeface="+mn-lt"/>
               </a:rPr>
               <a:t>        if </a:t>
             </a:r>
             <a:r>
-              <a:rPr lang="en-US" sz="2000" dirty="0" err="1">
+              <a:rPr lang="en-US" sz="2000" err="1">
                 <a:solidFill>
                   <a:schemeClr val="bg2"/>
                 </a:solidFill>
+                <a:latin typeface="Courier New"/>
                 <a:ea typeface="+mn-lt"/>
                 <a:cs typeface="+mn-lt"/>
               </a:rPr>
@@ -22152,15 +22249,17 @@
                 <a:solidFill>
                   <a:schemeClr val="bg2"/>
                 </a:solidFill>
+                <a:latin typeface="Courier New"/>
                 <a:ea typeface="+mn-lt"/>
                 <a:cs typeface="+mn-lt"/>
               </a:rPr>
               <a:t>[mid] == x: </a:t>
             </a:r>
-            <a:endParaRPr lang="en-US" sz="2000">
+            <a:endParaRPr lang="en-US" sz="2000" dirty="0">
               <a:solidFill>
                 <a:schemeClr val="bg2"/>
               </a:solidFill>
+              <a:latin typeface="Courier New"/>
               <a:cs typeface="Arial"/>
             </a:endParaRPr>
           </a:p>
@@ -22173,6 +22272,7 @@
                 <a:solidFill>
                   <a:srgbClr val="FFCC01"/>
                 </a:solidFill>
+                <a:latin typeface="Courier New"/>
                 <a:cs typeface="Arial"/>
               </a:rPr>
               <a:t> </a:t>
@@ -22182,15 +22282,17 @@
                 <a:solidFill>
                   <a:schemeClr val="bg2"/>
                 </a:solidFill>
+                <a:latin typeface="Courier New"/>
                 <a:ea typeface="+mn-lt"/>
                 <a:cs typeface="+mn-lt"/>
               </a:rPr>
               <a:t>           return mid </a:t>
             </a:r>
-            <a:endParaRPr lang="en-US" sz="2000">
+            <a:endParaRPr lang="en-US" sz="2000" dirty="0">
               <a:solidFill>
                 <a:schemeClr val="bg2"/>
               </a:solidFill>
+              <a:latin typeface="Courier New"/>
               <a:cs typeface="Arial"/>
             </a:endParaRPr>
           </a:p>
@@ -22203,6 +22305,7 @@
                 <a:solidFill>
                   <a:schemeClr val="bg2"/>
                 </a:solidFill>
+                <a:latin typeface="Courier New"/>
                 <a:ea typeface="+mn-lt"/>
                 <a:cs typeface="+mn-lt"/>
               </a:rPr>
@@ -22213,6 +22316,7 @@
                 <a:solidFill>
                   <a:schemeClr val="bg2"/>
                 </a:solidFill>
+                <a:latin typeface="Courier New"/>
                 <a:ea typeface="+mn-lt"/>
                 <a:cs typeface="+mn-lt"/>
               </a:rPr>
@@ -22223,6 +22327,7 @@
                 <a:solidFill>
                   <a:schemeClr val="bg2"/>
                 </a:solidFill>
+                <a:latin typeface="Courier New"/>
                 <a:ea typeface="+mn-lt"/>
                 <a:cs typeface="+mn-lt"/>
               </a:rPr>
@@ -22233,6 +22338,7 @@
                 <a:solidFill>
                   <a:schemeClr val="bg2"/>
                 </a:solidFill>
+                <a:latin typeface="Courier New"/>
                 <a:ea typeface="+mn-lt"/>
                 <a:cs typeface="+mn-lt"/>
               </a:rPr>
@@ -22243,15 +22349,17 @@
                 <a:solidFill>
                   <a:schemeClr val="bg2"/>
                 </a:solidFill>
+                <a:latin typeface="Courier New"/>
                 <a:ea typeface="+mn-lt"/>
                 <a:cs typeface="+mn-lt"/>
               </a:rPr>
               <a:t>[mid] &gt; x: </a:t>
             </a:r>
-            <a:endParaRPr lang="en-US" sz="2000">
+            <a:endParaRPr lang="en-US" sz="2000" dirty="0">
               <a:solidFill>
                 <a:schemeClr val="bg2"/>
               </a:solidFill>
+              <a:latin typeface="Courier New"/>
               <a:cs typeface="Arial"/>
             </a:endParaRPr>
           </a:p>
@@ -22264,6 +22372,7 @@
                 <a:solidFill>
                   <a:schemeClr val="bg2"/>
                 </a:solidFill>
+                <a:latin typeface="Courier New"/>
                 <a:ea typeface="+mn-lt"/>
                 <a:cs typeface="+mn-lt"/>
               </a:rPr>
@@ -22274,6 +22383,7 @@
                 <a:solidFill>
                   <a:schemeClr val="bg2"/>
                 </a:solidFill>
+                <a:latin typeface="Courier New"/>
                 <a:ea typeface="+mn-lt"/>
                 <a:cs typeface="+mn-lt"/>
               </a:rPr>
@@ -22284,6 +22394,7 @@
                 <a:solidFill>
                   <a:schemeClr val="bg2"/>
                 </a:solidFill>
+                <a:latin typeface="Courier New"/>
                 <a:ea typeface="+mn-lt"/>
                 <a:cs typeface="+mn-lt"/>
               </a:rPr>
@@ -22294,6 +22405,7 @@
                 <a:solidFill>
                   <a:schemeClr val="bg2"/>
                 </a:solidFill>
+                <a:latin typeface="Courier New"/>
                 <a:ea typeface="+mn-lt"/>
                 <a:cs typeface="+mn-lt"/>
               </a:rPr>
@@ -22304,15 +22416,17 @@
                 <a:solidFill>
                   <a:schemeClr val="bg2"/>
                 </a:solidFill>
+                <a:latin typeface="Courier New"/>
                 <a:ea typeface="+mn-lt"/>
                 <a:cs typeface="+mn-lt"/>
               </a:rPr>
               <a:t>, low, mid - 1, x) </a:t>
             </a:r>
-            <a:endParaRPr lang="en-US" sz="2000">
+            <a:endParaRPr lang="en-US" sz="2000" dirty="0">
               <a:solidFill>
                 <a:schemeClr val="bg2"/>
               </a:solidFill>
+              <a:latin typeface="Courier New"/>
               <a:cs typeface="Arial"/>
             </a:endParaRPr>
           </a:p>
@@ -22325,15 +22439,17 @@
                 <a:solidFill>
                   <a:schemeClr val="bg2"/>
                 </a:solidFill>
+                <a:latin typeface="Courier New"/>
                 <a:ea typeface="+mn-lt"/>
                 <a:cs typeface="+mn-lt"/>
               </a:rPr>
               <a:t>        else: </a:t>
             </a:r>
-            <a:endParaRPr lang="en-US" sz="2000">
+            <a:endParaRPr lang="en-US" sz="2000" dirty="0">
               <a:solidFill>
                 <a:schemeClr val="bg2"/>
               </a:solidFill>
+              <a:latin typeface="Courier New"/>
               <a:cs typeface="Arial"/>
             </a:endParaRPr>
           </a:p>
@@ -22346,6 +22462,7 @@
                 <a:solidFill>
                   <a:schemeClr val="bg2"/>
                 </a:solidFill>
+                <a:latin typeface="Courier New"/>
                 <a:ea typeface="+mn-lt"/>
                 <a:cs typeface="+mn-lt"/>
               </a:rPr>
@@ -22356,6 +22473,7 @@
                 <a:solidFill>
                   <a:schemeClr val="bg2"/>
                 </a:solidFill>
+                <a:latin typeface="Courier New"/>
                 <a:ea typeface="+mn-lt"/>
                 <a:cs typeface="+mn-lt"/>
               </a:rPr>
@@ -22366,6 +22484,7 @@
                 <a:solidFill>
                   <a:schemeClr val="bg2"/>
                 </a:solidFill>
+                <a:latin typeface="Courier New"/>
                 <a:ea typeface="+mn-lt"/>
                 <a:cs typeface="+mn-lt"/>
               </a:rPr>
@@ -22376,6 +22495,7 @@
                 <a:solidFill>
                   <a:schemeClr val="bg2"/>
                 </a:solidFill>
+                <a:latin typeface="Courier New"/>
                 <a:ea typeface="+mn-lt"/>
                 <a:cs typeface="+mn-lt"/>
               </a:rPr>
@@ -22386,15 +22506,17 @@
                 <a:solidFill>
                   <a:schemeClr val="bg2"/>
                 </a:solidFill>
+                <a:latin typeface="Courier New"/>
                 <a:ea typeface="+mn-lt"/>
                 <a:cs typeface="+mn-lt"/>
               </a:rPr>
               <a:t>, mid + 1, high, x) </a:t>
             </a:r>
-            <a:endParaRPr lang="en-US" sz="2000">
+            <a:endParaRPr lang="en-US" sz="2000" dirty="0">
               <a:solidFill>
                 <a:schemeClr val="bg2"/>
               </a:solidFill>
+              <a:latin typeface="Courier New"/>
               <a:cs typeface="Arial"/>
             </a:endParaRPr>
           </a:p>
@@ -22407,15 +22529,17 @@
                 <a:solidFill>
                   <a:schemeClr val="bg2"/>
                 </a:solidFill>
+                <a:latin typeface="Courier New"/>
                 <a:ea typeface="+mn-lt"/>
                 <a:cs typeface="+mn-lt"/>
               </a:rPr>
               <a:t>    else: </a:t>
             </a:r>
-            <a:endParaRPr lang="en-US" sz="2000">
+            <a:endParaRPr lang="en-US" sz="2000" dirty="0">
               <a:solidFill>
                 <a:schemeClr val="bg2"/>
               </a:solidFill>
+              <a:latin typeface="Courier New"/>
               <a:cs typeface="Arial"/>
             </a:endParaRPr>
           </a:p>
@@ -22428,25 +22552,29 @@
                 <a:solidFill>
                   <a:schemeClr val="bg2"/>
                 </a:solidFill>
+                <a:latin typeface="Courier New"/>
                 <a:ea typeface="+mn-lt"/>
                 <a:cs typeface="+mn-lt"/>
               </a:rPr>
               <a:t>        return -1 </a:t>
             </a:r>
-            <a:endParaRPr lang="en-US" sz="2000">
+            <a:endParaRPr lang="en-US" sz="2000" dirty="0">
               <a:solidFill>
                 <a:schemeClr val="bg2"/>
               </a:solidFill>
+              <a:latin typeface="Courier New"/>
               <a:cs typeface="Arial"/>
             </a:endParaRPr>
           </a:p>
           <a:p>
             <a:endParaRPr lang="en-US" sz="2000" dirty="0">
+              <a:latin typeface="Courier New"/>
               <a:cs typeface="Arial"/>
             </a:endParaRPr>
           </a:p>
           <a:p>
             <a:endParaRPr lang="en-US" sz="2000" dirty="0">
+              <a:latin typeface="Courier New"/>
               <a:cs typeface="Arial"/>
             </a:endParaRPr>
           </a:p>
@@ -22577,7 +22705,7 @@
           <a:lstStyle/>
           <a:p>
             <a:r>
-              <a:rPr lang="en-US" dirty="0">
+              <a:rPr lang="en-US">
                 <a:solidFill>
                   <a:schemeClr val="bg2"/>
                 </a:solidFill>
@@ -22586,7 +22714,7 @@
               </a:rPr>
               <a:t>Directory Traversal </a:t>
             </a:r>
-            <a:endParaRPr lang="en-US" dirty="0"/>
+            <a:endParaRPr lang="en-US"/>
           </a:p>
         </p:txBody>
       </p:sp>
@@ -22747,7 +22875,7 @@
           <a:lstStyle/>
           <a:p>
             <a:r>
-              <a:rPr lang="en-US" dirty="0">
+              <a:rPr lang="en-US">
                 <a:solidFill>
                   <a:schemeClr val="bg2"/>
                 </a:solidFill>
@@ -22756,7 +22884,7 @@
               </a:rPr>
               <a:t>Directory Traversal </a:t>
             </a:r>
-            <a:endParaRPr lang="en-US" dirty="0"/>
+            <a:endParaRPr lang="en-US"/>
           </a:p>
         </p:txBody>
       </p:sp>
@@ -22796,16 +22924,18 @@
                 <a:solidFill>
                   <a:schemeClr val="bg2"/>
                 </a:solidFill>
+                <a:latin typeface="Courier New"/>
                 <a:ea typeface="+mn-lt"/>
                 <a:cs typeface="+mn-lt"/>
               </a:rPr>
               <a:t>import </a:t>
             </a:r>
             <a:r>
-              <a:rPr lang="en-US" sz="2400" dirty="0" err="1">
+              <a:rPr lang="en-US" sz="2400" err="1">
                 <a:solidFill>
                   <a:schemeClr val="bg2"/>
                 </a:solidFill>
+                <a:latin typeface="Courier New"/>
                 <a:ea typeface="+mn-lt"/>
                 <a:cs typeface="+mn-lt"/>
               </a:rPr>
@@ -22816,20 +22946,23 @@
                 <a:solidFill>
                   <a:schemeClr val="bg2"/>
                 </a:solidFill>
+                <a:latin typeface="Courier New"/>
                 <a:ea typeface="+mn-lt"/>
                 <a:cs typeface="+mn-lt"/>
               </a:rPr>
               <a:t> </a:t>
             </a:r>
-            <a:endParaRPr lang="en-US" sz="2400">
+            <a:endParaRPr lang="en-US" sz="2400" dirty="0">
               <a:solidFill>
                 <a:schemeClr val="bg2"/>
               </a:solidFill>
+              <a:latin typeface="Courier New"/>
               <a:cs typeface="Arial"/>
             </a:endParaRPr>
           </a:p>
           <a:p>
             <a:endParaRPr lang="en-US" sz="2400" dirty="0">
+              <a:latin typeface="Courier New"/>
               <a:cs typeface="Arial"/>
             </a:endParaRPr>
           </a:p>
@@ -22842,6 +22975,7 @@
                 <a:solidFill>
                   <a:schemeClr val="bg2"/>
                 </a:solidFill>
+                <a:latin typeface="Courier New"/>
                 <a:ea typeface="+mn-lt"/>
                 <a:cs typeface="+mn-lt"/>
               </a:rPr>
@@ -22852,6 +22986,7 @@
                 <a:solidFill>
                   <a:schemeClr val="bg2"/>
                 </a:solidFill>
+                <a:latin typeface="Courier New"/>
                 <a:ea typeface="+mn-lt"/>
                 <a:cs typeface="+mn-lt"/>
               </a:rPr>
@@ -22862,6 +22997,7 @@
                 <a:solidFill>
                   <a:schemeClr val="bg2"/>
                 </a:solidFill>
+                <a:latin typeface="Courier New"/>
                 <a:ea typeface="+mn-lt"/>
                 <a:cs typeface="+mn-lt"/>
               </a:rPr>
@@ -22871,6 +23007,7 @@
               <a:solidFill>
                 <a:schemeClr val="bg2"/>
               </a:solidFill>
+              <a:latin typeface="Courier New"/>
               <a:cs typeface="Arial"/>
             </a:endParaRPr>
           </a:p>
@@ -22883,6 +23020,7 @@
                 <a:solidFill>
                   <a:schemeClr val="bg2"/>
                 </a:solidFill>
+                <a:latin typeface="Courier New"/>
                 <a:ea typeface="+mn-lt"/>
                 <a:cs typeface="+mn-lt"/>
               </a:rPr>
@@ -22893,6 +23031,7 @@
                 <a:solidFill>
                   <a:schemeClr val="bg2"/>
                 </a:solidFill>
+                <a:latin typeface="Courier New"/>
                 <a:ea typeface="+mn-lt"/>
                 <a:cs typeface="+mn-lt"/>
               </a:rPr>
@@ -22903,6 +23042,7 @@
                 <a:solidFill>
                   <a:schemeClr val="bg2"/>
                 </a:solidFill>
+                <a:latin typeface="Courier New"/>
                 <a:ea typeface="+mn-lt"/>
                 <a:cs typeface="+mn-lt"/>
               </a:rPr>
@@ -22912,6 +23052,7 @@
               <a:solidFill>
                 <a:schemeClr val="bg2"/>
               </a:solidFill>
+              <a:latin typeface="Courier New"/>
               <a:cs typeface="Arial"/>
             </a:endParaRPr>
           </a:p>
@@ -22924,6 +23065,7 @@
                 <a:solidFill>
                   <a:schemeClr val="bg2"/>
                 </a:solidFill>
+                <a:latin typeface="Courier New"/>
                 <a:ea typeface="+mn-lt"/>
                 <a:cs typeface="+mn-lt"/>
               </a:rPr>
@@ -22934,6 +23076,7 @@
                 <a:solidFill>
                   <a:schemeClr val="bg2"/>
                 </a:solidFill>
+                <a:latin typeface="Courier New"/>
                 <a:ea typeface="+mn-lt"/>
                 <a:cs typeface="+mn-lt"/>
               </a:rPr>
@@ -22944,6 +23087,7 @@
                 <a:solidFill>
                   <a:schemeClr val="bg2"/>
                 </a:solidFill>
+                <a:latin typeface="Courier New"/>
                 <a:ea typeface="+mn-lt"/>
                 <a:cs typeface="+mn-lt"/>
               </a:rPr>
@@ -22954,6 +23098,7 @@
                 <a:solidFill>
                   <a:schemeClr val="bg2"/>
                 </a:solidFill>
+                <a:latin typeface="Courier New"/>
                 <a:ea typeface="+mn-lt"/>
                 <a:cs typeface="+mn-lt"/>
               </a:rPr>
@@ -22964,6 +23109,7 @@
                 <a:solidFill>
                   <a:schemeClr val="bg2"/>
                 </a:solidFill>
+                <a:latin typeface="Courier New"/>
                 <a:ea typeface="+mn-lt"/>
                 <a:cs typeface="+mn-lt"/>
               </a:rPr>
@@ -22973,6 +23119,7 @@
               <a:solidFill>
                 <a:schemeClr val="bg2"/>
               </a:solidFill>
+              <a:latin typeface="Courier New"/>
               <a:cs typeface="Arial"/>
             </a:endParaRPr>
           </a:p>
@@ -22985,6 +23132,7 @@
                 <a:solidFill>
                   <a:schemeClr val="bg2"/>
                 </a:solidFill>
+                <a:latin typeface="Courier New"/>
                 <a:ea typeface="+mn-lt"/>
                 <a:cs typeface="+mn-lt"/>
               </a:rPr>
@@ -22995,6 +23143,7 @@
                 <a:solidFill>
                   <a:schemeClr val="bg2"/>
                 </a:solidFill>
+                <a:latin typeface="Courier New"/>
                 <a:ea typeface="+mn-lt"/>
                 <a:cs typeface="+mn-lt"/>
               </a:rPr>
@@ -23005,6 +23154,7 @@
                 <a:solidFill>
                   <a:schemeClr val="bg2"/>
                 </a:solidFill>
+                <a:latin typeface="Courier New"/>
                 <a:ea typeface="+mn-lt"/>
                 <a:cs typeface="+mn-lt"/>
               </a:rPr>
@@ -23015,6 +23165,7 @@
                 <a:solidFill>
                   <a:schemeClr val="bg2"/>
                 </a:solidFill>
+                <a:latin typeface="Courier New"/>
                 <a:ea typeface="+mn-lt"/>
                 <a:cs typeface="+mn-lt"/>
               </a:rPr>
@@ -23025,6 +23176,7 @@
                 <a:solidFill>
                   <a:schemeClr val="bg2"/>
                 </a:solidFill>
+                <a:latin typeface="Courier New"/>
                 <a:ea typeface="+mn-lt"/>
                 <a:cs typeface="+mn-lt"/>
               </a:rPr>
@@ -23034,6 +23186,7 @@
               <a:solidFill>
                 <a:schemeClr val="bg2"/>
               </a:solidFill>
+              <a:latin typeface="Courier New"/>
               <a:cs typeface="Arial"/>
             </a:endParaRPr>
           </a:p>
@@ -23046,6 +23199,7 @@
                 <a:solidFill>
                   <a:schemeClr val="bg2"/>
                 </a:solidFill>
+                <a:latin typeface="Courier New"/>
                 <a:ea typeface="+mn-lt"/>
                 <a:cs typeface="+mn-lt"/>
               </a:rPr>
@@ -23056,6 +23210,7 @@
                 <a:solidFill>
                   <a:schemeClr val="bg2"/>
                 </a:solidFill>
+                <a:latin typeface="Courier New"/>
                 <a:ea typeface="+mn-lt"/>
                 <a:cs typeface="+mn-lt"/>
               </a:rPr>
@@ -23066,6 +23221,7 @@
                 <a:solidFill>
                   <a:schemeClr val="bg2"/>
                 </a:solidFill>
+                <a:latin typeface="Courier New"/>
                 <a:ea typeface="+mn-lt"/>
                 <a:cs typeface="+mn-lt"/>
               </a:rPr>
@@ -23076,6 +23232,7 @@
                 <a:solidFill>
                   <a:schemeClr val="bg2"/>
                 </a:solidFill>
+                <a:latin typeface="Courier New"/>
                 <a:ea typeface="+mn-lt"/>
                 <a:cs typeface="+mn-lt"/>
               </a:rPr>
@@ -23086,6 +23243,7 @@
                 <a:solidFill>
                   <a:schemeClr val="bg2"/>
                 </a:solidFill>
+                <a:latin typeface="Courier New"/>
                 <a:ea typeface="+mn-lt"/>
                 <a:cs typeface="+mn-lt"/>
               </a:rPr>
@@ -23095,6 +23253,7 @@
               <a:solidFill>
                 <a:schemeClr val="bg2"/>
               </a:solidFill>
+              <a:latin typeface="Courier New"/>
               <a:cs typeface="Arial"/>
             </a:endParaRPr>
           </a:p>
@@ -23107,6 +23266,7 @@
                 <a:solidFill>
                   <a:schemeClr val="bg2"/>
                 </a:solidFill>
+                <a:latin typeface="Courier New"/>
                 <a:ea typeface="+mn-lt"/>
                 <a:cs typeface="+mn-lt"/>
               </a:rPr>
@@ -23116,6 +23276,7 @@
               <a:solidFill>
                 <a:schemeClr val="bg2"/>
               </a:solidFill>
+              <a:latin typeface="Courier New"/>
               <a:cs typeface="Arial"/>
             </a:endParaRPr>
           </a:p>
@@ -23128,16 +23289,18 @@
                 <a:solidFill>
                   <a:schemeClr val="bg2"/>
                 </a:solidFill>
+                <a:latin typeface="Courier New"/>
                 <a:ea typeface="+mn-lt"/>
                 <a:cs typeface="+mn-lt"/>
               </a:rPr>
               <a:t>            print(</a:t>
             </a:r>
             <a:r>
-              <a:rPr lang="en-US" sz="2400" dirty="0" err="1">
+              <a:rPr lang="en-US" sz="2400" err="1">
                 <a:solidFill>
                   <a:schemeClr val="bg2"/>
                 </a:solidFill>
+                <a:latin typeface="Courier New"/>
                 <a:ea typeface="+mn-lt"/>
                 <a:cs typeface="+mn-lt"/>
               </a:rPr>
@@ -23148,6 +23311,7 @@
                 <a:solidFill>
                   <a:schemeClr val="bg2"/>
                 </a:solidFill>
+                <a:latin typeface="Courier New"/>
                 <a:ea typeface="+mn-lt"/>
                 <a:cs typeface="+mn-lt"/>
               </a:rPr>
@@ -23157,16 +23321,19 @@
               <a:solidFill>
                 <a:schemeClr val="bg2"/>
               </a:solidFill>
+              <a:latin typeface="Courier New"/>
               <a:cs typeface="Arial"/>
             </a:endParaRPr>
           </a:p>
           <a:p>
             <a:endParaRPr lang="en-US" sz="2400" dirty="0">
+              <a:latin typeface="Courier New"/>
               <a:cs typeface="Arial"/>
             </a:endParaRPr>
           </a:p>
           <a:p>
             <a:endParaRPr lang="en-US" sz="2400" dirty="0">
+              <a:latin typeface="Courier New"/>
               <a:cs typeface="Arial"/>
             </a:endParaRPr>
           </a:p>
@@ -23297,7 +23464,7 @@
           <a:lstStyle/>
           <a:p>
             <a:r>
-              <a:rPr lang="en-US" dirty="0">
+              <a:rPr lang="en-US">
                 <a:solidFill>
                   <a:schemeClr val="bg2"/>
                 </a:solidFill>
@@ -23306,7 +23473,7 @@
               </a:rPr>
               <a:t>Other Thoughts / On Your Own </a:t>
             </a:r>
-            <a:endParaRPr lang="en-US" dirty="0"/>
+            <a:endParaRPr lang="en-US"/>
           </a:p>
         </p:txBody>
       </p:sp>
@@ -23334,7 +23501,7 @@
           <a:lstStyle/>
           <a:p>
             <a:r>
-              <a:rPr lang="en-US" sz="2800" dirty="0">
+              <a:rPr lang="en-US" sz="2800">
                 <a:solidFill>
                   <a:schemeClr val="bg2"/>
                 </a:solidFill>
@@ -23350,7 +23517,7 @@
               <a:buChar char="§"/>
             </a:pPr>
             <a:r>
-              <a:rPr lang="en-US" sz="2800" dirty="0">
+              <a:rPr lang="en-US" sz="2800">
                 <a:solidFill>
                   <a:schemeClr val="bg2"/>
                 </a:solidFill>
@@ -23368,7 +23535,7 @@
           </a:p>
           <a:p>
             <a:r>
-              <a:rPr lang="en-US" sz="2800" dirty="0">
+              <a:rPr lang="en-US" sz="2800">
                 <a:solidFill>
                   <a:schemeClr val="bg2"/>
                 </a:solidFill>
@@ -23377,7 +23544,7 @@
               </a:rPr>
               <a:t>Recursive vs Iterative </a:t>
             </a:r>
-            <a:endParaRPr lang="en-US" sz="2800" dirty="0">
+            <a:endParaRPr lang="en-US" sz="2800">
               <a:solidFill>
                 <a:schemeClr val="bg2"/>
               </a:solidFill>
@@ -23386,7 +23553,7 @@
           </a:p>
           <a:p>
             <a:r>
-              <a:rPr lang="en-US" sz="2800" dirty="0">
+              <a:rPr lang="en-US" sz="2800">
                 <a:solidFill>
                   <a:schemeClr val="bg2"/>
                 </a:solidFill>
@@ -23395,7 +23562,7 @@
               </a:rPr>
               <a:t>Tail-call optimization </a:t>
             </a:r>
-            <a:endParaRPr lang="en-US" sz="2800" dirty="0">
+            <a:endParaRPr lang="en-US" sz="2800">
               <a:solidFill>
                 <a:schemeClr val="bg2"/>
               </a:solidFill>
@@ -23403,22 +23570,22 @@
             </a:endParaRPr>
           </a:p>
           <a:p>
-            <a:endParaRPr lang="en-US" sz="2800" dirty="0">
+            <a:endParaRPr lang="en-US" sz="2800">
               <a:cs typeface="Arial"/>
             </a:endParaRPr>
           </a:p>
           <a:p>
-            <a:endParaRPr lang="en-US" sz="2800" dirty="0">
+            <a:endParaRPr lang="en-US" sz="2800">
               <a:cs typeface="Arial"/>
             </a:endParaRPr>
           </a:p>
           <a:p>
-            <a:endParaRPr lang="en-US" sz="2800" dirty="0">
+            <a:endParaRPr lang="en-US" sz="2800">
               <a:cs typeface="Arial"/>
             </a:endParaRPr>
           </a:p>
           <a:p>
-            <a:endParaRPr lang="en-US" sz="2800" dirty="0">
+            <a:endParaRPr lang="en-US" sz="2800">
               <a:cs typeface="Arial"/>
             </a:endParaRPr>
           </a:p>
@@ -23581,7 +23748,7 @@
           <a:lstStyle/>
           <a:p>
             <a:r>
-              <a:rPr lang="en-US" dirty="0">
+              <a:rPr lang="en-US">
                 <a:solidFill>
                   <a:schemeClr val="bg2"/>
                 </a:solidFill>
@@ -23590,7 +23757,7 @@
               </a:rPr>
               <a:t>Questions?</a:t>
             </a:r>
-            <a:endParaRPr lang="en-US" dirty="0">
+            <a:endParaRPr lang="en-US">
               <a:solidFill>
                 <a:schemeClr val="bg2"/>
               </a:solidFill>
@@ -23742,7 +23909,7 @@
           <a:lstStyle/>
           <a:p>
             <a:r>
-              <a:rPr lang="en-US" dirty="0">
+              <a:rPr lang="en-US">
                 <a:solidFill>
                   <a:schemeClr val="bg2"/>
                 </a:solidFill>
@@ -23751,7 +23918,7 @@
               </a:rPr>
               <a:t>What is recursion? </a:t>
             </a:r>
-            <a:endParaRPr lang="en-US" dirty="0">
+            <a:endParaRPr lang="en-US">
               <a:solidFill>
                 <a:schemeClr val="bg2"/>
               </a:solidFill>
@@ -23783,7 +23950,7 @@
           <a:lstStyle/>
           <a:p>
             <a:r>
-              <a:rPr lang="en-US" sz="2800" dirty="0">
+              <a:rPr lang="en-US" sz="2800">
                 <a:solidFill>
                   <a:schemeClr val="bg2"/>
                 </a:solidFill>
@@ -23801,7 +23968,7 @@
           </a:p>
           <a:p>
             <a:r>
-              <a:rPr lang="en-US" sz="2800" dirty="0">
+              <a:rPr lang="en-US" sz="2800">
                 <a:solidFill>
                   <a:schemeClr val="bg2"/>
                 </a:solidFill>
@@ -23810,7 +23977,7 @@
               </a:rPr>
               <a:t>An algorithm that uses itself in its definition </a:t>
             </a:r>
-            <a:endParaRPr lang="en-US" sz="2800" dirty="0">
+            <a:endParaRPr lang="en-US" sz="2800">
               <a:solidFill>
                 <a:schemeClr val="bg2"/>
               </a:solidFill>
@@ -23819,7 +23986,7 @@
           </a:p>
           <a:p>
             <a:r>
-              <a:rPr lang="en-US" sz="2800" dirty="0">
+              <a:rPr lang="en-US" sz="2800">
                 <a:solidFill>
                   <a:schemeClr val="bg2"/>
                 </a:solidFill>
@@ -23828,7 +23995,7 @@
               </a:rPr>
               <a:t>“pip installs packages” </a:t>
             </a:r>
-            <a:endParaRPr lang="en-US" sz="2800" dirty="0">
+            <a:endParaRPr lang="en-US" sz="2800">
               <a:solidFill>
                 <a:schemeClr val="bg2"/>
               </a:solidFill>
@@ -23837,7 +24004,7 @@
           </a:p>
           <a:p>
             <a:r>
-              <a:rPr lang="en-US" sz="2800" dirty="0">
+              <a:rPr lang="en-US" sz="2800">
                 <a:solidFill>
                   <a:schemeClr val="bg2"/>
                 </a:solidFill>
@@ -23846,7 +24013,7 @@
               </a:rPr>
               <a:t>Two requirements: </a:t>
             </a:r>
-            <a:endParaRPr lang="en-US" sz="2800" dirty="0">
+            <a:endParaRPr lang="en-US" sz="2800">
               <a:solidFill>
                 <a:schemeClr val="bg2"/>
               </a:solidFill>
@@ -23859,7 +24026,7 @@
               <a:buChar char="§"/>
             </a:pPr>
             <a:r>
-              <a:rPr lang="en-US" sz="2400" dirty="0">
+              <a:rPr lang="en-US" sz="2400">
                 <a:solidFill>
                   <a:schemeClr val="bg2"/>
                 </a:solidFill>
@@ -23881,7 +24048,7 @@
               <a:buChar char="§"/>
             </a:pPr>
             <a:r>
-              <a:rPr lang="en-US" sz="2400" dirty="0">
+              <a:rPr lang="en-US" sz="2400">
                 <a:solidFill>
                   <a:schemeClr val="bg2"/>
                 </a:solidFill>
@@ -23890,7 +24057,7 @@
               </a:rPr>
               <a:t>A recursive step </a:t>
             </a:r>
-            <a:endParaRPr lang="en-US" sz="2400" dirty="0">
+            <a:endParaRPr lang="en-US" sz="2400">
               <a:solidFill>
                 <a:schemeClr val="bg2"/>
               </a:solidFill>
@@ -24054,7 +24221,7 @@
           <a:lstStyle/>
           <a:p>
             <a:r>
-              <a:rPr lang="en-US" dirty="0">
+              <a:rPr lang="en-US">
                 <a:solidFill>
                   <a:schemeClr val="bg2"/>
                 </a:solidFill>
@@ -24063,7 +24230,7 @@
               </a:rPr>
               <a:t>Terms</a:t>
             </a:r>
-            <a:endParaRPr lang="en-US" dirty="0">
+            <a:endParaRPr lang="en-US">
               <a:solidFill>
                 <a:schemeClr val="bg2"/>
               </a:solidFill>
@@ -24095,7 +24262,7 @@
           <a:lstStyle/>
           <a:p>
             <a:r>
-              <a:rPr lang="en-US" sz="2800" dirty="0">
+              <a:rPr lang="en-US" sz="2800">
                 <a:solidFill>
                   <a:schemeClr val="bg2"/>
                 </a:solidFill>
@@ -24103,60 +24270,6 @@
                 <a:cs typeface="+mn-lt"/>
               </a:rPr>
               <a:t>Base case: </a:t>
-            </a:r>
-            <a:endParaRPr lang="en-US" sz="2800" dirty="0">
-              <a:solidFill>
-                <a:schemeClr val="bg2"/>
-              </a:solidFill>
-              <a:cs typeface="Arial"/>
-            </a:endParaRPr>
-          </a:p>
-          <a:p>
-            <a:pPr lvl="2">
-              <a:buFont typeface="Wingdings" panose="020B0604020202020204" pitchFamily="34" charset="0"/>
-              <a:buChar char="§"/>
-            </a:pPr>
-            <a:r>
-              <a:rPr lang="en-US" sz="2400" dirty="0">
-                <a:solidFill>
-                  <a:schemeClr val="bg2"/>
-                </a:solidFill>
-                <a:ea typeface="+mn-lt"/>
-                <a:cs typeface="+mn-lt"/>
-              </a:rPr>
-              <a:t>The “terminating step” </a:t>
-            </a:r>
-            <a:endParaRPr lang="en-US" sz="2400" dirty="0">
-              <a:solidFill>
-                <a:schemeClr val="bg2"/>
-              </a:solidFill>
-              <a:cs typeface="Arial"/>
-            </a:endParaRPr>
-          </a:p>
-          <a:p>
-            <a:pPr lvl="2">
-              <a:buFont typeface="Wingdings" panose="020B0604020202020204" pitchFamily="34" charset="0"/>
-              <a:buChar char="§"/>
-            </a:pPr>
-            <a:r>
-              <a:rPr lang="en-US" sz="2400" dirty="0">
-                <a:solidFill>
-                  <a:schemeClr val="bg2"/>
-                </a:solidFill>
-                <a:ea typeface="+mn-lt"/>
-                <a:cs typeface="+mn-lt"/>
-              </a:rPr>
-              <a:t>How does the recursion stop?</a:t>
-            </a:r>
-            <a:r>
-              <a:rPr lang="en-US" sz="2800" dirty="0">
-                <a:solidFill>
-                  <a:schemeClr val="bg2"/>
-                </a:solidFill>
-                <a:ea typeface="+mn-lt"/>
-                <a:cs typeface="+mn-lt"/>
-              </a:rPr>
-              <a:t> </a:t>
             </a:r>
             <a:endParaRPr lang="en-US" sz="2800">
               <a:solidFill>
@@ -24166,65 +24279,19 @@
             </a:endParaRPr>
           </a:p>
           <a:p>
-            <a:endParaRPr lang="en-US" sz="2800" dirty="0">
-              <a:cs typeface="Arial"/>
-            </a:endParaRPr>
-          </a:p>
-          <a:p>
-            <a:endParaRPr lang="en-US" sz="2800" dirty="0">
-              <a:cs typeface="Arial"/>
-            </a:endParaRPr>
-          </a:p>
-        </p:txBody>
-      </p:sp>
-      <p:sp>
-        <p:nvSpPr>
-          <p:cNvPr id="8" name="Content Placeholder 7">
-            <a:extLst>
-              <a:ext uri="{FF2B5EF4-FFF2-40B4-BE49-F238E27FC236}">
-                <a16:creationId xmlns:a16="http://schemas.microsoft.com/office/drawing/2014/main" id="{918D997A-0A06-7B06-E6AF-CC7A114B979E}"/>
-              </a:ext>
-            </a:extLst>
-          </p:cNvPr>
-          <p:cNvSpPr>
-            <a:spLocks noGrp="1"/>
-          </p:cNvSpPr>
-          <p:nvPr>
-            <p:ph sz="half" idx="2"/>
-          </p:nvPr>
-        </p:nvSpPr>
-        <p:spPr/>
-        <p:txBody>
-          <a:bodyPr vert="horz" lIns="0" tIns="0" rIns="0" bIns="0" spcCol="365760" rtlCol="0" anchor="t">
-            <a:noAutofit/>
-          </a:bodyPr>
-          <a:lstStyle/>
-          <a:p>
-            <a:r>
-              <a:rPr lang="en-US" sz="2800" dirty="0">
-                <a:solidFill>
-                  <a:schemeClr val="bg2"/>
-                </a:solidFill>
-                <a:ea typeface="+mn-lt"/>
-                <a:cs typeface="+mn-lt"/>
-              </a:rPr>
-              <a:t>Recursive step: </a:t>
-            </a:r>
-          </a:p>
-          <a:p>
             <a:pPr lvl="2">
               <a:buFont typeface="Wingdings" panose="020B0604020202020204" pitchFamily="34" charset="0"/>
               <a:buChar char="§"/>
             </a:pPr>
             <a:r>
-              <a:rPr lang="en-US" sz="2400" dirty="0">
+              <a:rPr lang="en-US" sz="2400">
                 <a:solidFill>
                   <a:schemeClr val="bg2"/>
                 </a:solidFill>
                 <a:ea typeface="+mn-lt"/>
                 <a:cs typeface="+mn-lt"/>
               </a:rPr>
-              <a:t>Decreases the size of the input </a:t>
+              <a:t>The “terminating step” </a:t>
             </a:r>
             <a:endParaRPr lang="en-US" sz="2400">
               <a:solidFill>
@@ -24239,14 +24306,92 @@
               <a:buChar char="§"/>
             </a:pPr>
             <a:r>
-              <a:rPr lang="en-US" sz="2400" dirty="0">
+              <a:rPr lang="en-US" sz="2400">
                 <a:solidFill>
                   <a:schemeClr val="bg2"/>
                 </a:solidFill>
                 <a:ea typeface="+mn-lt"/>
                 <a:cs typeface="+mn-lt"/>
               </a:rPr>
-              <a:t>Passes smaller input to a new instance of itself </a:t>
+              <a:t>How does the recursion stop?</a:t>
+            </a:r>
+            <a:r>
+              <a:rPr lang="en-US" sz="2800">
+                <a:solidFill>
+                  <a:schemeClr val="bg2"/>
+                </a:solidFill>
+                <a:ea typeface="+mn-lt"/>
+                <a:cs typeface="+mn-lt"/>
+              </a:rPr>
+              <a:t> </a:t>
+            </a:r>
+            <a:endParaRPr lang="en-US" sz="2800">
+              <a:solidFill>
+                <a:schemeClr val="bg2"/>
+              </a:solidFill>
+              <a:cs typeface="Arial"/>
+            </a:endParaRPr>
+          </a:p>
+          <a:p>
+            <a:endParaRPr lang="en-US" sz="2800">
+              <a:cs typeface="Arial"/>
+            </a:endParaRPr>
+          </a:p>
+          <a:p>
+            <a:endParaRPr lang="en-US" sz="2800">
+              <a:cs typeface="Arial"/>
+            </a:endParaRPr>
+          </a:p>
+        </p:txBody>
+      </p:sp>
+      <p:sp>
+        <p:nvSpPr>
+          <p:cNvPr id="8" name="Content Placeholder 7">
+            <a:extLst>
+              <a:ext uri="{FF2B5EF4-FFF2-40B4-BE49-F238E27FC236}">
+                <a16:creationId xmlns:a16="http://schemas.microsoft.com/office/drawing/2014/main" id="{918D997A-0A06-7B06-E6AF-CC7A114B979E}"/>
+              </a:ext>
+            </a:extLst>
+          </p:cNvPr>
+          <p:cNvSpPr>
+            <a:spLocks noGrp="1"/>
+          </p:cNvSpPr>
+          <p:nvPr>
+            <p:ph sz="half" idx="2"/>
+          </p:nvPr>
+        </p:nvSpPr>
+        <p:spPr/>
+        <p:txBody>
+          <a:bodyPr vert="horz" lIns="0" tIns="0" rIns="0" bIns="0" spcCol="365760" rtlCol="0" anchor="t">
+            <a:noAutofit/>
+          </a:bodyPr>
+          <a:lstStyle/>
+          <a:p>
+            <a:r>
+              <a:rPr lang="en-US" sz="2800">
+                <a:solidFill>
+                  <a:schemeClr val="bg2"/>
+                </a:solidFill>
+                <a:ea typeface="+mn-lt"/>
+                <a:cs typeface="+mn-lt"/>
+              </a:rPr>
+              <a:t>Recursive step: </a:t>
+            </a:r>
+          </a:p>
+          <a:p>
+            <a:pPr lvl="2">
+              <a:buFont typeface="Wingdings" panose="020B0604020202020204" pitchFamily="34" charset="0"/>
+              <a:buChar char="§"/>
+            </a:pPr>
+            <a:r>
+              <a:rPr lang="en-US" sz="2400">
+                <a:solidFill>
+                  <a:schemeClr val="bg2"/>
+                </a:solidFill>
+                <a:ea typeface="+mn-lt"/>
+                <a:cs typeface="+mn-lt"/>
+              </a:rPr>
+              <a:t>Decreases the size of the input </a:t>
             </a:r>
             <a:endParaRPr lang="en-US" sz="2400">
               <a:solidFill>
@@ -24256,12 +24401,34 @@
             </a:endParaRPr>
           </a:p>
           <a:p>
-            <a:endParaRPr lang="en-US" sz="2800" dirty="0">
+            <a:pPr lvl="2">
+              <a:buFont typeface="Wingdings" panose="020B0604020202020204" pitchFamily="34" charset="0"/>
+              <a:buChar char="§"/>
+            </a:pPr>
+            <a:r>
+              <a:rPr lang="en-US" sz="2400">
+                <a:solidFill>
+                  <a:schemeClr val="bg2"/>
+                </a:solidFill>
+                <a:ea typeface="+mn-lt"/>
+                <a:cs typeface="+mn-lt"/>
+              </a:rPr>
+              <a:t>Passes smaller input to a new instance of itself </a:t>
+            </a:r>
+            <a:endParaRPr lang="en-US" sz="2400">
+              <a:solidFill>
+                <a:schemeClr val="bg2"/>
+              </a:solidFill>
               <a:cs typeface="Arial"/>
             </a:endParaRPr>
           </a:p>
           <a:p>
-            <a:endParaRPr lang="en-US" sz="2800" dirty="0">
+            <a:endParaRPr lang="en-US" sz="2800">
+              <a:cs typeface="Arial"/>
+            </a:endParaRPr>
+          </a:p>
+          <a:p>
+            <a:endParaRPr lang="en-US" sz="2800">
               <a:cs typeface="Arial"/>
             </a:endParaRPr>
           </a:p>
@@ -24386,7 +24553,7 @@
           <a:lstStyle/>
           <a:p>
             <a:r>
-              <a:rPr lang="en-US" dirty="0">
+              <a:rPr lang="en-US">
                 <a:solidFill>
                   <a:schemeClr val="bg2"/>
                 </a:solidFill>
@@ -24395,7 +24562,7 @@
               </a:rPr>
               <a:t>An example </a:t>
             </a:r>
-            <a:endParaRPr lang="en-US" dirty="0">
+            <a:endParaRPr lang="en-US">
               <a:solidFill>
                 <a:schemeClr val="bg2"/>
               </a:solidFill>
@@ -24427,7 +24594,7 @@
           <a:lstStyle/>
           <a:p>
             <a:r>
-              <a:rPr lang="en-US" sz="2800" dirty="0">
+              <a:rPr lang="en-US" sz="2800">
                 <a:solidFill>
                   <a:schemeClr val="bg2"/>
                 </a:solidFill>
@@ -24435,60 +24602,6 @@
                 <a:cs typeface="+mn-lt"/>
               </a:rPr>
               <a:t>What is(are) the base case(s)? </a:t>
-            </a:r>
-            <a:endParaRPr lang="en-US" sz="2800" dirty="0">
-              <a:solidFill>
-                <a:schemeClr val="bg2"/>
-              </a:solidFill>
-              <a:cs typeface="Arial"/>
-            </a:endParaRPr>
-          </a:p>
-          <a:p>
-            <a:r>
-              <a:rPr lang="en-US" sz="2800" dirty="0">
-                <a:solidFill>
-                  <a:schemeClr val="bg2"/>
-                </a:solidFill>
-                <a:ea typeface="+mn-lt"/>
-                <a:cs typeface="+mn-lt"/>
-              </a:rPr>
-              <a:t>What is(are) the recursive step(s)? </a:t>
-            </a:r>
-            <a:endParaRPr lang="en-US" sz="2800" dirty="0">
-              <a:solidFill>
-                <a:schemeClr val="bg2"/>
-              </a:solidFill>
-              <a:cs typeface="Arial"/>
-            </a:endParaRPr>
-          </a:p>
-          <a:p>
-            <a:r>
-              <a:rPr lang="en-US" sz="2800" dirty="0">
-                <a:solidFill>
-                  <a:schemeClr val="bg2"/>
-                </a:solidFill>
-                <a:ea typeface="+mn-lt"/>
-                <a:cs typeface="+mn-lt"/>
-              </a:rPr>
-              <a:t>The input datatype doesn’t change </a:t>
-            </a:r>
-            <a:endParaRPr lang="en-US" sz="2800" dirty="0">
-              <a:solidFill>
-                <a:schemeClr val="bg2"/>
-              </a:solidFill>
-              <a:cs typeface="Arial"/>
-            </a:endParaRPr>
-          </a:p>
-          <a:p>
-            <a:r>
-              <a:rPr lang="en-US" sz="2800" dirty="0">
-                <a:solidFill>
-                  <a:schemeClr val="bg2"/>
-                </a:solidFill>
-                <a:ea typeface="+mn-lt"/>
-                <a:cs typeface="+mn-lt"/>
-              </a:rPr>
-              <a:t>Small demo </a:t>
             </a:r>
             <a:endParaRPr lang="en-US" sz="2800">
               <a:solidFill>
@@ -24497,34 +24610,7 @@
               <a:cs typeface="Arial"/>
             </a:endParaRPr>
           </a:p>
-        </p:txBody>
-      </p:sp>
-      <p:sp>
-        <p:nvSpPr>
-          <p:cNvPr id="8" name="Content Placeholder 7">
-            <a:extLst>
-              <a:ext uri="{FF2B5EF4-FFF2-40B4-BE49-F238E27FC236}">
-                <a16:creationId xmlns:a16="http://schemas.microsoft.com/office/drawing/2014/main" id="{24E78C1C-E064-347C-2437-40225FA9E3E6}"/>
-              </a:ext>
-            </a:extLst>
-          </p:cNvPr>
-          <p:cNvSpPr>
-            <a:spLocks noGrp="1"/>
-          </p:cNvSpPr>
-          <p:nvPr>
-            <p:ph sz="half" idx="2"/>
-          </p:nvPr>
-        </p:nvSpPr>
-        <p:spPr/>
-        <p:txBody>
-          <a:bodyPr vert="horz" lIns="0" tIns="0" rIns="0" bIns="0" spcCol="365760" rtlCol="0" anchor="t">
-            <a:noAutofit/>
-          </a:bodyPr>
-          <a:lstStyle/>
-          <a:p>
-            <a:pPr marL="0" indent="0">
-              <a:buNone/>
-            </a:pPr>
+          <a:p>
             <a:r>
               <a:rPr lang="en-US" sz="2800">
                 <a:solidFill>
@@ -24533,25 +24619,9 @@
                 <a:ea typeface="+mn-lt"/>
                 <a:cs typeface="+mn-lt"/>
               </a:rPr>
-              <a:t>def factorial(n: int): </a:t>
-            </a:r>
-            <a:endParaRPr lang="en-US"/>
-          </a:p>
-          <a:p>
-            <a:pPr marL="0" indent="0">
-              <a:buNone/>
-            </a:pPr>
-            <a:r>
-              <a:rPr lang="en-US" sz="2800" dirty="0">
-                <a:solidFill>
-                  <a:schemeClr val="bg2"/>
-                </a:solidFill>
-                <a:ea typeface="+mn-lt"/>
-                <a:cs typeface="+mn-lt"/>
-              </a:rPr>
-              <a:t>    if n == 1 or n == 0: </a:t>
-            </a:r>
-            <a:endParaRPr lang="en-US" sz="2800" dirty="0">
+              <a:t>What is(are) the recursive step(s)? </a:t>
+            </a:r>
+            <a:endParaRPr lang="en-US" sz="2800">
               <a:solidFill>
                 <a:schemeClr val="bg2"/>
               </a:solidFill>
@@ -24559,20 +24629,17 @@
             </a:endParaRPr>
           </a:p>
           <a:p>
-            <a:pPr marL="0" indent="0">
-              <a:buNone/>
-            </a:pPr>
-            <a:r>
-              <a:rPr lang="en-US" sz="2800" dirty="0">
+            <a:r>
+              <a:rPr lang="en-US" sz="2800">
                 <a:solidFill>
                   <a:schemeClr val="bg2"/>
                 </a:solidFill>
                 <a:ea typeface="+mn-lt"/>
                 <a:cs typeface="+mn-lt"/>
               </a:rPr>
-              <a:t>        return 1 </a:t>
-            </a:r>
-            <a:endParaRPr lang="en-US" sz="2800" dirty="0">
+              <a:t>The input datatype doesn’t change </a:t>
+            </a:r>
+            <a:endParaRPr lang="en-US" sz="2800">
               <a:solidFill>
                 <a:schemeClr val="bg2"/>
               </a:solidFill>
@@ -24580,48 +24647,171 @@
             </a:endParaRPr>
           </a:p>
           <a:p>
-            <a:pPr marL="0" indent="0">
-              <a:buNone/>
-            </a:pPr>
-            <a:r>
-              <a:rPr lang="en-US" sz="2800" dirty="0">
+            <a:r>
+              <a:rPr lang="en-US" sz="2800">
                 <a:solidFill>
                   <a:schemeClr val="bg2"/>
                 </a:solidFill>
                 <a:ea typeface="+mn-lt"/>
                 <a:cs typeface="+mn-lt"/>
               </a:rPr>
-              <a:t>    return n * factorial(n - 1) </a:t>
-            </a:r>
-            <a:endParaRPr lang="en-US" sz="2800" dirty="0">
+              <a:t>Small demo </a:t>
+            </a:r>
+            <a:endParaRPr lang="en-US" sz="2800">
               <a:solidFill>
                 <a:schemeClr val="bg2"/>
               </a:solidFill>
               <a:cs typeface="Arial"/>
             </a:endParaRPr>
           </a:p>
-          <a:p>
-            <a:endParaRPr lang="en-US" sz="2800" dirty="0">
+        </p:txBody>
+      </p:sp>
+      <p:sp>
+        <p:nvSpPr>
+          <p:cNvPr id="8" name="Content Placeholder 7">
+            <a:extLst>
+              <a:ext uri="{FF2B5EF4-FFF2-40B4-BE49-F238E27FC236}">
+                <a16:creationId xmlns:a16="http://schemas.microsoft.com/office/drawing/2014/main" id="{24E78C1C-E064-347C-2437-40225FA9E3E6}"/>
+              </a:ext>
+            </a:extLst>
+          </p:cNvPr>
+          <p:cNvSpPr>
+            <a:spLocks noGrp="1"/>
+          </p:cNvSpPr>
+          <p:nvPr>
+            <p:ph sz="half" idx="2"/>
+          </p:nvPr>
+        </p:nvSpPr>
+        <p:spPr>
+          <a:xfrm>
+            <a:off x="5924155" y="1600199"/>
+            <a:ext cx="5732342" cy="4493173"/>
+          </a:xfrm>
+        </p:spPr>
+        <p:txBody>
+          <a:bodyPr vert="horz" lIns="0" tIns="0" rIns="0" bIns="0" spcCol="365760" rtlCol="0" anchor="t">
+            <a:noAutofit/>
+          </a:bodyPr>
+          <a:lstStyle/>
+          <a:p>
+            <a:pPr marL="0" indent="0">
+              <a:buNone/>
+            </a:pPr>
+            <a:r>
+              <a:rPr lang="en-US" sz="2400" dirty="0">
+                <a:solidFill>
+                  <a:schemeClr val="bg2"/>
+                </a:solidFill>
+                <a:latin typeface="Courier New"/>
+                <a:ea typeface="+mn-lt"/>
+                <a:cs typeface="+mn-lt"/>
+              </a:rPr>
+              <a:t>def factorial(n: int): </a:t>
+            </a:r>
+            <a:endParaRPr lang="en-US" sz="2400">
+              <a:solidFill>
+                <a:schemeClr val="bg2"/>
+              </a:solidFill>
+              <a:latin typeface="Courier New"/>
+              <a:cs typeface="Courier New"/>
+            </a:endParaRPr>
+          </a:p>
+          <a:p>
+            <a:pPr marL="0" indent="0">
+              <a:buNone/>
+            </a:pPr>
+            <a:r>
+              <a:rPr lang="en-US" sz="2400" dirty="0">
+                <a:solidFill>
+                  <a:schemeClr val="bg2"/>
+                </a:solidFill>
+                <a:latin typeface="Courier New"/>
+                <a:ea typeface="+mn-lt"/>
+                <a:cs typeface="+mn-lt"/>
+              </a:rPr>
+              <a:t>    if n == 1 or n == 0: </a:t>
+            </a:r>
+            <a:endParaRPr lang="en-US" sz="2400">
+              <a:solidFill>
+                <a:schemeClr val="bg2"/>
+              </a:solidFill>
+              <a:latin typeface="Courier New"/>
               <a:cs typeface="Arial"/>
             </a:endParaRPr>
           </a:p>
           <a:p>
-            <a:endParaRPr lang="en-US" sz="2800" dirty="0">
+            <a:pPr marL="0" indent="0">
+              <a:buNone/>
+            </a:pPr>
+            <a:r>
+              <a:rPr lang="en-US" sz="2400" dirty="0">
+                <a:solidFill>
+                  <a:schemeClr val="bg2"/>
+                </a:solidFill>
+                <a:latin typeface="Courier New"/>
+                <a:ea typeface="+mn-lt"/>
+                <a:cs typeface="+mn-lt"/>
+              </a:rPr>
+              <a:t>        return 1 </a:t>
+            </a:r>
+            <a:endParaRPr lang="en-US" sz="2400">
+              <a:solidFill>
+                <a:schemeClr val="bg2"/>
+              </a:solidFill>
+              <a:latin typeface="Courier New"/>
               <a:cs typeface="Arial"/>
             </a:endParaRPr>
           </a:p>
           <a:p>
-            <a:endParaRPr lang="en-US" sz="2800" dirty="0">
+            <a:pPr marL="0" indent="0">
+              <a:buNone/>
+            </a:pPr>
+            <a:r>
+              <a:rPr lang="en-US" sz="2400" dirty="0">
+                <a:solidFill>
+                  <a:schemeClr val="bg2"/>
+                </a:solidFill>
+                <a:latin typeface="Courier New"/>
+                <a:ea typeface="+mn-lt"/>
+                <a:cs typeface="+mn-lt"/>
+              </a:rPr>
+              <a:t>    return n * factorial(n - 1) </a:t>
+            </a:r>
+            <a:endParaRPr lang="en-US" sz="2400" dirty="0">
+              <a:solidFill>
+                <a:schemeClr val="bg2"/>
+              </a:solidFill>
+              <a:latin typeface="Courier New"/>
               <a:cs typeface="Arial"/>
             </a:endParaRPr>
           </a:p>
           <a:p>
             <a:endParaRPr lang="en-US" sz="2800" dirty="0">
+              <a:latin typeface="Courier New"/>
               <a:cs typeface="Arial"/>
             </a:endParaRPr>
           </a:p>
           <a:p>
             <a:endParaRPr lang="en-US" sz="2800" dirty="0">
+              <a:latin typeface="Courier New"/>
+              <a:cs typeface="Arial"/>
+            </a:endParaRPr>
+          </a:p>
+          <a:p>
+            <a:endParaRPr lang="en-US" sz="2800" dirty="0">
+              <a:latin typeface="Courier New"/>
+              <a:cs typeface="Arial"/>
+            </a:endParaRPr>
+          </a:p>
+          <a:p>
+            <a:endParaRPr lang="en-US" sz="2800" dirty="0">
+              <a:latin typeface="Courier New"/>
+              <a:cs typeface="Arial"/>
+            </a:endParaRPr>
+          </a:p>
+          <a:p>
+            <a:endParaRPr lang="en-US" sz="2800" dirty="0">
+              <a:latin typeface="Courier New"/>
               <a:cs typeface="Arial"/>
             </a:endParaRPr>
           </a:p>
@@ -24700,8 +24890,8 @@
         </p:nvSpPr>
         <p:spPr>
           <a:xfrm>
-            <a:off x="6631063" y="2144664"/>
-            <a:ext cx="3132635" cy="995302"/>
+            <a:off x="6552235" y="2052695"/>
+            <a:ext cx="3986601" cy="850787"/>
           </a:xfrm>
           <a:prstGeom prst="rect">
             <a:avLst/>
@@ -24848,8 +25038,8 @@
         </p:nvCxnSpPr>
         <p:spPr>
           <a:xfrm>
-            <a:off x="5407780" y="2008651"/>
-            <a:ext cx="1210143" cy="259232"/>
+            <a:off x="5460331" y="2008651"/>
+            <a:ext cx="1065627" cy="167268"/>
           </a:xfrm>
           <a:prstGeom prst="straightConnector1">
             <a:avLst/>
@@ -24890,8 +25080,8 @@
         </p:nvSpPr>
         <p:spPr>
           <a:xfrm>
-            <a:off x="8202701" y="3182938"/>
-            <a:ext cx="2386472" cy="499410"/>
+            <a:off x="8544286" y="2972730"/>
+            <a:ext cx="3095921" cy="473135"/>
           </a:xfrm>
           <a:prstGeom prst="rect">
             <a:avLst/>
@@ -25032,8 +25222,8 @@
         </p:nvCxnSpPr>
         <p:spPr>
           <a:xfrm>
-            <a:off x="4646198" y="2637165"/>
-            <a:ext cx="3556503" cy="585184"/>
+            <a:off x="4672473" y="2624027"/>
+            <a:ext cx="3845539" cy="611460"/>
           </a:xfrm>
           <a:prstGeom prst="straightConnector1">
             <a:avLst/>
@@ -25123,7 +25313,7 @@
           <a:lstStyle/>
           <a:p>
             <a:r>
-              <a:rPr lang="en-US" sz="2800" dirty="0">
+              <a:rPr lang="en-US" sz="2800">
                 <a:solidFill>
                   <a:schemeClr val="bg2"/>
                 </a:solidFill>
@@ -25132,7 +25322,7 @@
               </a:rPr>
               <a:t>Order of Execution / Return Values </a:t>
             </a:r>
-            <a:endParaRPr lang="en-US" sz="2800" dirty="0">
+            <a:endParaRPr lang="en-US" sz="2800">
               <a:solidFill>
                 <a:schemeClr val="bg2"/>
               </a:solidFill>
@@ -25298,7 +25488,7 @@
           <a:lstStyle/>
           <a:p>
             <a:r>
-              <a:rPr lang="en-US" dirty="0">
+              <a:rPr lang="en-US">
                 <a:solidFill>
                   <a:schemeClr val="bg2"/>
                 </a:solidFill>
@@ -25307,7 +25497,7 @@
               </a:rPr>
               <a:t>On Your Own </a:t>
             </a:r>
-            <a:endParaRPr lang="en-US" dirty="0"/>
+            <a:endParaRPr lang="en-US"/>
           </a:p>
         </p:txBody>
       </p:sp>
@@ -25340,7 +25530,7 @@
           <a:lstStyle/>
           <a:p>
             <a:r>
-              <a:rPr lang="en-US" sz="2800" dirty="0">
+              <a:rPr lang="en-US" sz="2800">
                 <a:solidFill>
                   <a:schemeClr val="bg2"/>
                 </a:solidFill>
@@ -25349,7 +25539,7 @@
               </a:rPr>
               <a:t>Calculate the sum of a list of numbers using recursion </a:t>
             </a:r>
-            <a:endParaRPr lang="en-US" sz="2800" dirty="0">
+            <a:endParaRPr lang="en-US" sz="2800">
               <a:solidFill>
                 <a:schemeClr val="bg2"/>
               </a:solidFill>
@@ -25358,7 +25548,7 @@
           </a:p>
           <a:p>
             <a:r>
-              <a:rPr lang="en-US" sz="2800" dirty="0">
+              <a:rPr lang="en-US" sz="2800">
                 <a:solidFill>
                   <a:schemeClr val="bg2"/>
                 </a:solidFill>
@@ -25367,7 +25557,7 @@
               </a:rPr>
               <a:t>What is(are) the base case(s)? </a:t>
             </a:r>
-            <a:endParaRPr lang="en-US" sz="2800" dirty="0">
+            <a:endParaRPr lang="en-US" sz="2800">
               <a:solidFill>
                 <a:schemeClr val="bg2"/>
               </a:solidFill>
@@ -25376,7 +25566,7 @@
           </a:p>
           <a:p>
             <a:r>
-              <a:rPr lang="en-US" sz="2800" dirty="0">
+              <a:rPr lang="en-US" sz="2800">
                 <a:solidFill>
                   <a:schemeClr val="bg2"/>
                 </a:solidFill>
@@ -25385,7 +25575,7 @@
               </a:rPr>
               <a:t>What is(are) the recursive step(s)? </a:t>
             </a:r>
-            <a:endParaRPr lang="en-US" sz="2800" dirty="0">
+            <a:endParaRPr lang="en-US" sz="2800">
               <a:solidFill>
                 <a:schemeClr val="bg2"/>
               </a:solidFill>
@@ -25394,7 +25584,7 @@
           </a:p>
           <a:p>
             <a:r>
-              <a:rPr lang="en-US" sz="2800" dirty="0">
+              <a:rPr lang="en-US" sz="2800">
                 <a:solidFill>
                   <a:schemeClr val="bg2"/>
                 </a:solidFill>
@@ -25537,7 +25727,7 @@
           <a:lstStyle/>
           <a:p>
             <a:r>
-              <a:rPr lang="en-US" dirty="0">
+              <a:rPr lang="en-US">
                 <a:solidFill>
                   <a:schemeClr val="bg2"/>
                 </a:solidFill>
@@ -25546,7 +25736,7 @@
               </a:rPr>
               <a:t>A solution </a:t>
             </a:r>
-            <a:endParaRPr lang="en-US" dirty="0">
+            <a:endParaRPr lang="en-US">
               <a:solidFill>
                 <a:schemeClr val="bg2"/>
               </a:solidFill>
@@ -25570,7 +25760,12 @@
             <p:ph idx="1"/>
           </p:nvPr>
         </p:nvSpPr>
-        <p:spPr/>
+        <p:spPr>
+          <a:xfrm>
+            <a:off x="548640" y="1679025"/>
+            <a:ext cx="10697101" cy="4493173"/>
+          </a:xfrm>
+        </p:spPr>
         <p:txBody>
           <a:bodyPr vert="horz" lIns="0" tIns="0" rIns="0" bIns="0" spcCol="365760" rtlCol="0" anchor="t">
             <a:noAutofit/>
@@ -25585,16 +25780,18 @@
                 <a:solidFill>
                   <a:schemeClr val="bg2"/>
                 </a:solidFill>
+                <a:latin typeface="Courier New"/>
                 <a:ea typeface="+mn-lt"/>
                 <a:cs typeface="+mn-lt"/>
               </a:rPr>
               <a:t>def </a:t>
             </a:r>
             <a:r>
-              <a:rPr lang="en-US" sz="2400" dirty="0" err="1">
+              <a:rPr lang="en-US" sz="2400" err="1">
                 <a:solidFill>
                   <a:schemeClr val="bg2"/>
                 </a:solidFill>
+                <a:latin typeface="Courier New"/>
                 <a:ea typeface="+mn-lt"/>
                 <a:cs typeface="+mn-lt"/>
               </a:rPr>
@@ -25605,16 +25802,18 @@
                 <a:solidFill>
                   <a:schemeClr val="bg2"/>
                 </a:solidFill>
+                <a:latin typeface="Courier New"/>
                 <a:ea typeface="+mn-lt"/>
                 <a:cs typeface="+mn-lt"/>
               </a:rPr>
               <a:t>(</a:t>
             </a:r>
             <a:r>
-              <a:rPr lang="en-US" sz="2400" dirty="0" err="1">
+              <a:rPr lang="en-US" sz="2400" err="1">
                 <a:solidFill>
                   <a:schemeClr val="bg2"/>
                 </a:solidFill>
+                <a:latin typeface="Courier New"/>
                 <a:ea typeface="+mn-lt"/>
                 <a:cs typeface="+mn-lt"/>
               </a:rPr>
@@ -25625,15 +25824,17 @@
                 <a:solidFill>
                   <a:schemeClr val="bg2"/>
                 </a:solidFill>
+                <a:latin typeface="Courier New"/>
                 <a:ea typeface="+mn-lt"/>
                 <a:cs typeface="+mn-lt"/>
               </a:rPr>
               <a:t>: list[int]) -&gt; int: </a:t>
             </a:r>
-            <a:endParaRPr lang="en-US" sz="2400" dirty="0">
+            <a:endParaRPr lang="en-US" sz="2400">
               <a:solidFill>
                 <a:schemeClr val="bg2"/>
               </a:solidFill>
+              <a:latin typeface="Courier New"/>
               <a:cs typeface="Arial"/>
             </a:endParaRPr>
           </a:p>
@@ -25646,16 +25847,18 @@
                 <a:solidFill>
                   <a:schemeClr val="bg2"/>
                 </a:solidFill>
+                <a:latin typeface="Courier New"/>
                 <a:ea typeface="+mn-lt"/>
                 <a:cs typeface="+mn-lt"/>
               </a:rPr>
               <a:t>    if </a:t>
             </a:r>
             <a:r>
-              <a:rPr lang="en-US" sz="2400" dirty="0" err="1">
+              <a:rPr lang="en-US" sz="2400" err="1">
                 <a:solidFill>
                   <a:schemeClr val="bg2"/>
                 </a:solidFill>
+                <a:latin typeface="Courier New"/>
                 <a:ea typeface="+mn-lt"/>
                 <a:cs typeface="+mn-lt"/>
               </a:rPr>
@@ -25666,16 +25869,18 @@
                 <a:solidFill>
                   <a:schemeClr val="bg2"/>
                 </a:solidFill>
+                <a:latin typeface="Courier New"/>
                 <a:ea typeface="+mn-lt"/>
                 <a:cs typeface="+mn-lt"/>
               </a:rPr>
               <a:t>(</a:t>
             </a:r>
             <a:r>
-              <a:rPr lang="en-US" sz="2400" dirty="0" err="1">
+              <a:rPr lang="en-US" sz="2400" err="1">
                 <a:solidFill>
                   <a:schemeClr val="bg2"/>
                 </a:solidFill>
+                <a:latin typeface="Courier New"/>
                 <a:ea typeface="+mn-lt"/>
                 <a:cs typeface="+mn-lt"/>
               </a:rPr>
@@ -25686,15 +25891,17 @@
                 <a:solidFill>
                   <a:schemeClr val="bg2"/>
                 </a:solidFill>
+                <a:latin typeface="Courier New"/>
                 <a:ea typeface="+mn-lt"/>
                 <a:cs typeface="+mn-lt"/>
               </a:rPr>
               <a:t>) == 1: </a:t>
             </a:r>
-            <a:endParaRPr lang="en-US" sz="2400" dirty="0">
+            <a:endParaRPr lang="en-US" sz="2400">
               <a:solidFill>
                 <a:schemeClr val="bg2"/>
               </a:solidFill>
+              <a:latin typeface="Courier New"/>
               <a:cs typeface="Arial"/>
             </a:endParaRPr>
           </a:p>
@@ -25707,16 +25914,18 @@
                 <a:solidFill>
                   <a:schemeClr val="bg2"/>
                 </a:solidFill>
+                <a:latin typeface="Courier New"/>
                 <a:ea typeface="+mn-lt"/>
                 <a:cs typeface="+mn-lt"/>
               </a:rPr>
               <a:t>        return </a:t>
             </a:r>
             <a:r>
-              <a:rPr lang="en-US" sz="2400" dirty="0" err="1">
+              <a:rPr lang="en-US" sz="2400" err="1">
                 <a:solidFill>
                   <a:schemeClr val="bg2"/>
                 </a:solidFill>
+                <a:latin typeface="Courier New"/>
                 <a:ea typeface="+mn-lt"/>
                 <a:cs typeface="+mn-lt"/>
               </a:rPr>
@@ -25727,20 +25936,23 @@
                 <a:solidFill>
                   <a:schemeClr val="bg2"/>
                 </a:solidFill>
+                <a:latin typeface="Courier New"/>
                 <a:ea typeface="+mn-lt"/>
                 <a:cs typeface="+mn-lt"/>
               </a:rPr>
               <a:t>()</a:t>
             </a:r>
-            <a:endParaRPr lang="en-US" sz="2400" dirty="0">
+            <a:endParaRPr lang="en-US" sz="2400">
               <a:solidFill>
                 <a:schemeClr val="bg2"/>
               </a:solidFill>
+              <a:latin typeface="Courier New"/>
               <a:cs typeface="Arial"/>
             </a:endParaRPr>
           </a:p>
           <a:p>
             <a:endParaRPr lang="en-US" sz="2400" dirty="0">
+              <a:latin typeface="Courier New"/>
               <a:cs typeface="Arial"/>
             </a:endParaRPr>
           </a:p>
@@ -25753,16 +25965,18 @@
                 <a:solidFill>
                   <a:schemeClr val="bg2"/>
                 </a:solidFill>
+                <a:latin typeface="Courier New"/>
                 <a:ea typeface="+mn-lt"/>
                 <a:cs typeface="+mn-lt"/>
               </a:rPr>
               <a:t>    last = </a:t>
             </a:r>
             <a:r>
-              <a:rPr lang="en-US" sz="2400" dirty="0" err="1">
+              <a:rPr lang="en-US" sz="2400" err="1">
                 <a:solidFill>
                   <a:schemeClr val="bg2"/>
                 </a:solidFill>
+                <a:latin typeface="Courier New"/>
                 <a:ea typeface="+mn-lt"/>
                 <a:cs typeface="+mn-lt"/>
               </a:rPr>
@@ -25773,15 +25987,17 @@
                 <a:solidFill>
                   <a:schemeClr val="bg2"/>
                 </a:solidFill>
+                <a:latin typeface="Courier New"/>
                 <a:ea typeface="+mn-lt"/>
                 <a:cs typeface="+mn-lt"/>
               </a:rPr>
               <a:t>() </a:t>
             </a:r>
-            <a:endParaRPr lang="en-US" sz="2400" dirty="0">
+            <a:endParaRPr lang="en-US" sz="2400">
               <a:solidFill>
                 <a:schemeClr val="bg2"/>
               </a:solidFill>
+              <a:latin typeface="Courier New"/>
               <a:cs typeface="Arial"/>
             </a:endParaRPr>
           </a:p>
@@ -25794,16 +26010,18 @@
                 <a:solidFill>
                   <a:schemeClr val="bg2"/>
                 </a:solidFill>
+                <a:latin typeface="Courier New"/>
                 <a:ea typeface="+mn-lt"/>
                 <a:cs typeface="+mn-lt"/>
               </a:rPr>
               <a:t>    print(</a:t>
             </a:r>
             <a:r>
-              <a:rPr lang="en-US" sz="2400" dirty="0" err="1">
+              <a:rPr lang="en-US" sz="2400" err="1">
                 <a:solidFill>
                   <a:schemeClr val="bg2"/>
                 </a:solidFill>
+                <a:latin typeface="Courier New"/>
                 <a:ea typeface="+mn-lt"/>
                 <a:cs typeface="+mn-lt"/>
               </a:rPr>
@@ -25814,16 +26032,18 @@
                 <a:solidFill>
                   <a:schemeClr val="bg2"/>
                 </a:solidFill>
+                <a:latin typeface="Courier New"/>
                 <a:ea typeface="+mn-lt"/>
                 <a:cs typeface="+mn-lt"/>
               </a:rPr>
               <a:t> {</a:t>
             </a:r>
             <a:r>
-              <a:rPr lang="en-US" sz="2400" dirty="0" err="1">
+              <a:rPr lang="en-US" sz="2400" err="1">
                 <a:solidFill>
                   <a:schemeClr val="bg2"/>
                 </a:solidFill>
+                <a:latin typeface="Courier New"/>
                 <a:ea typeface="+mn-lt"/>
                 <a:cs typeface="+mn-lt"/>
               </a:rPr>
@@ -25834,6 +26054,7 @@
                 <a:solidFill>
                   <a:schemeClr val="bg2"/>
                 </a:solidFill>
+                <a:latin typeface="Courier New"/>
                 <a:ea typeface="+mn-lt"/>
                 <a:cs typeface="+mn-lt"/>
               </a:rPr>
@@ -25843,6 +26064,7 @@
               <a:solidFill>
                 <a:schemeClr val="bg2"/>
               </a:solidFill>
+              <a:latin typeface="Courier New"/>
               <a:cs typeface="Arial"/>
             </a:endParaRPr>
           </a:p>
@@ -25855,16 +26077,18 @@
                 <a:solidFill>
                   <a:schemeClr val="bg2"/>
                 </a:solidFill>
+                <a:latin typeface="Courier New"/>
                 <a:ea typeface="+mn-lt"/>
                 <a:cs typeface="+mn-lt"/>
               </a:rPr>
               <a:t>    return </a:t>
             </a:r>
             <a:r>
-              <a:rPr lang="en-US" sz="2400" dirty="0" err="1">
+              <a:rPr lang="en-US" sz="2400" err="1">
                 <a:solidFill>
                   <a:schemeClr val="bg2"/>
                 </a:solidFill>
+                <a:latin typeface="Courier New"/>
                 <a:ea typeface="+mn-lt"/>
                 <a:cs typeface="+mn-lt"/>
               </a:rPr>
@@ -25875,16 +26099,18 @@
                 <a:solidFill>
                   <a:schemeClr val="bg2"/>
                 </a:solidFill>
+                <a:latin typeface="Courier New"/>
                 <a:ea typeface="+mn-lt"/>
                 <a:cs typeface="+mn-lt"/>
               </a:rPr>
               <a:t>(</a:t>
             </a:r>
             <a:r>
-              <a:rPr lang="en-US" sz="2400" dirty="0" err="1">
+              <a:rPr lang="en-US" sz="2400" err="1">
                 <a:solidFill>
                   <a:schemeClr val="bg2"/>
                 </a:solidFill>
+                <a:latin typeface="Courier New"/>
                 <a:ea typeface="+mn-lt"/>
                 <a:cs typeface="+mn-lt"/>
               </a:rPr>
@@ -25895,6 +26121,7 @@
                 <a:solidFill>
                   <a:schemeClr val="bg2"/>
                 </a:solidFill>
+                <a:latin typeface="Courier New"/>
                 <a:ea typeface="+mn-lt"/>
                 <a:cs typeface="+mn-lt"/>
               </a:rPr>
@@ -25904,6 +26131,7 @@
               <a:solidFill>
                 <a:schemeClr val="bg2"/>
               </a:solidFill>
+              <a:latin typeface="Courier New"/>
               <a:cs typeface="Arial"/>
             </a:endParaRPr>
           </a:p>
@@ -26034,7 +26262,7 @@
           <a:lstStyle/>
           <a:p>
             <a:r>
-              <a:rPr lang="en-US" dirty="0">
+              <a:rPr lang="en-US">
                 <a:solidFill>
                   <a:schemeClr val="bg2"/>
                 </a:solidFill>
@@ -26043,7 +26271,7 @@
               </a:rPr>
               <a:t>More about stacks </a:t>
             </a:r>
-            <a:endParaRPr lang="en-US" dirty="0">
+            <a:endParaRPr lang="en-US">
               <a:solidFill>
                 <a:schemeClr val="bg2"/>
               </a:solidFill>
@@ -26074,7 +26302,7 @@
           </a:bodyPr>
           <a:lstStyle/>
           <a:p>
-            <a:endParaRPr lang="en-US" dirty="0">
+            <a:endParaRPr lang="en-US">
               <a:solidFill>
                 <a:schemeClr val="bg2"/>
               </a:solidFill>
@@ -26085,7 +26313,7 @@
             <a:pPr marL="0" indent="0">
               <a:buNone/>
             </a:pPr>
-            <a:endParaRPr lang="en-US" dirty="0">
+            <a:endParaRPr lang="en-US">
               <a:cs typeface="Arial"/>
             </a:endParaRPr>
           </a:p>
@@ -26115,7 +26343,7 @@
           <a:lstStyle/>
           <a:p>
             <a:r>
-              <a:rPr lang="en-US" sz="2800" dirty="0">
+              <a:rPr lang="en-US" sz="2800">
                 <a:solidFill>
                   <a:schemeClr val="bg2"/>
                 </a:solidFill>
@@ -26124,7 +26352,7 @@
               </a:rPr>
               <a:t>What bad things can happen here? </a:t>
             </a:r>
-            <a:endParaRPr lang="en-US" sz="2800" dirty="0">
+            <a:endParaRPr lang="en-US" sz="2800">
               <a:solidFill>
                 <a:schemeClr val="bg2"/>
               </a:solidFill>
@@ -26132,28 +26360,28 @@
             </a:endParaRPr>
           </a:p>
           <a:p>
-            <a:endParaRPr lang="en-US" sz="2800" dirty="0">
+            <a:endParaRPr lang="en-US" sz="2800">
               <a:cs typeface="Arial"/>
             </a:endParaRPr>
           </a:p>
           <a:p>
-            <a:endParaRPr lang="en-US" sz="2800" dirty="0">
+            <a:endParaRPr lang="en-US" sz="2800">
               <a:cs typeface="Arial"/>
             </a:endParaRPr>
           </a:p>
           <a:p>
-            <a:endParaRPr lang="en-US" sz="2800" dirty="0">
+            <a:endParaRPr lang="en-US" sz="2800">
               <a:cs typeface="Arial"/>
             </a:endParaRPr>
           </a:p>
           <a:p>
-            <a:endParaRPr lang="en-US" sz="2800" dirty="0">
+            <a:endParaRPr lang="en-US" sz="2800">
               <a:cs typeface="Arial"/>
             </a:endParaRPr>
           </a:p>
           <a:p>
             <a:r>
-              <a:rPr lang="en-US" sz="2800" dirty="0">
+              <a:rPr lang="en-US" sz="2800">
                 <a:solidFill>
                   <a:schemeClr val="bg2"/>
                 </a:solidFill>
@@ -26162,7 +26390,7 @@
               </a:rPr>
               <a:t>Don’t forget the base case! </a:t>
             </a:r>
-            <a:endParaRPr lang="en-US" sz="2800" dirty="0">
+            <a:endParaRPr lang="en-US" sz="2800">
               <a:solidFill>
                 <a:schemeClr val="bg2"/>
               </a:solidFill>
@@ -26171,7 +26399,7 @@
           </a:p>
           <a:p>
             <a:r>
-              <a:rPr lang="en-US" sz="2800" dirty="0">
+              <a:rPr lang="en-US" sz="2800">
                 <a:solidFill>
                   <a:schemeClr val="bg2"/>
                 </a:solidFill>
@@ -26332,7 +26560,7 @@
           <a:lstStyle/>
           <a:p>
             <a:r>
-              <a:rPr lang="en-US" dirty="0">
+              <a:rPr lang="en-US">
                 <a:solidFill>
                   <a:schemeClr val="bg2"/>
                 </a:solidFill>
@@ -26341,7 +26569,7 @@
               </a:rPr>
               <a:t>Multiple Recursion </a:t>
             </a:r>
-            <a:endParaRPr lang="en-US" dirty="0"/>
+            <a:endParaRPr lang="en-US"/>
           </a:p>
         </p:txBody>
       </p:sp>
@@ -26998,65 +27226,6 @@
 </file>
 
 <file path=customXml/item1.xml><?xml version="1.0" encoding="utf-8"?>
-<?mso-contentType ?>
-<spe:Receivers xmlns:spe="http://schemas.microsoft.com/sharepoint/events">
-  <Receiver>
-    <Name>Document ID Generator</Name>
-    <Synchronization>Synchronous</Synchronization>
-    <Type>10001</Type>
-    <SequenceNumber>1000</SequenceNumber>
-    <Url/>
-    <Assembly>Microsoft.Office.DocumentManagement, Version=16.0.0.0, Culture=neutral, PublicKeyToken=71e9bce111e9429c</Assembly>
-    <Class>Microsoft.Office.DocumentManagement.Internal.DocIdHandler</Class>
-    <Data/>
-    <Filter/>
-  </Receiver>
-  <Receiver>
-    <Name>Document ID Generator</Name>
-    <Synchronization>Synchronous</Synchronization>
-    <Type>10002</Type>
-    <SequenceNumber>1001</SequenceNumber>
-    <Url/>
-    <Assembly>Microsoft.Office.DocumentManagement, Version=16.0.0.0, Culture=neutral, PublicKeyToken=71e9bce111e9429c</Assembly>
-    <Class>Microsoft.Office.DocumentManagement.Internal.DocIdHandler</Class>
-    <Data/>
-    <Filter/>
-  </Receiver>
-  <Receiver>
-    <Name>Document ID Generator</Name>
-    <Synchronization>Synchronous</Synchronization>
-    <Type>10004</Type>
-    <SequenceNumber>1002</SequenceNumber>
-    <Url/>
-    <Assembly>Microsoft.Office.DocumentManagement, Version=16.0.0.0, Culture=neutral, PublicKeyToken=71e9bce111e9429c</Assembly>
-    <Class>Microsoft.Office.DocumentManagement.Internal.DocIdHandler</Class>
-    <Data/>
-    <Filter/>
-  </Receiver>
-  <Receiver>
-    <Name>Document ID Generator</Name>
-    <Synchronization>Synchronous</Synchronization>
-    <Type>10006</Type>
-    <SequenceNumber>1003</SequenceNumber>
-    <Url/>
-    <Assembly>Microsoft.Office.DocumentManagement, Version=16.0.0.0, Culture=neutral, PublicKeyToken=71e9bce111e9429c</Assembly>
-    <Class>Microsoft.Office.DocumentManagement.Internal.DocIdHandler</Class>
-    <Data/>
-    <Filter/>
-  </Receiver>
-</spe:Receivers>
-</file>
-
-<file path=customXml/item2.xml><?xml version="1.0" encoding="utf-8"?>
-<?mso-contentType ?>
-<FormTemplates xmlns="http://schemas.microsoft.com/sharepoint/v3/contenttype/forms">
-  <Display>DocumentLibraryForm</Display>
-  <Edit>DocumentLibraryForm</Edit>
-  <New>DocumentLibraryForm</New>
-</FormTemplates>
-</file>
-
-<file path=customXml/item3.xml><?xml version="1.0" encoding="utf-8"?>
 <p:properties xmlns:p="http://schemas.microsoft.com/office/2006/metadata/properties" xmlns:xsi="http://www.w3.org/2001/XMLSchema-instance" xmlns:pc="http://schemas.microsoft.com/office/infopath/2007/PartnerControls">
   <documentManagement>
     <Name_x0028_Outlook_x0029_ xmlns="819a213c-e595-4af7-868c-5311d0f07b09">
@@ -27178,7 +27347,7 @@
 </p:properties>
 </file>
 
-<file path=customXml/item4.xml><?xml version="1.0" encoding="utf-8"?>
+<file path=customXml/item2.xml><?xml version="1.0" encoding="utf-8"?>
 <ct:contentTypeSchema xmlns:ct="http://schemas.microsoft.com/office/2006/metadata/contentType" xmlns:ma="http://schemas.microsoft.com/office/2006/metadata/properties/metaAttributes" ct:_="" ma:_="" ma:contentTypeName="Document" ma:contentTypeID="0x010100744FEF590B341F46AAAF568C3B82DA74" ma:contentTypeVersion="126" ma:contentTypeDescription="Create a new document." ma:contentTypeScope="" ma:versionID="da2759216466bc3ec804369b15a902a5">
   <xsd:schema xmlns:xsd="http://www.w3.org/2001/XMLSchema" xmlns:xs="http://www.w3.org/2001/XMLSchema" xmlns:p="http://schemas.microsoft.com/office/2006/metadata/properties" xmlns:ns1="http://schemas.microsoft.com/sharepoint/v3" xmlns:ns2="819a213c-e595-4af7-868c-5311d0f07b09" xmlns:ns3="43c4306d-bcae-48a3-b5b4-6245fba36c72" targetNamespace="http://schemas.microsoft.com/office/2006/metadata/properties" ma:root="true" ma:fieldsID="23a203c7101a14e7e286c2f61aba86b7" ns1:_="" ns2:_="" ns3:_="">
     <xsd:import namespace="http://schemas.microsoft.com/sharepoint/v3"/>
@@ -27637,7 +27806,98 @@
 </ct:contentTypeSchema>
 </file>
 
+<file path=customXml/item3.xml><?xml version="1.0" encoding="utf-8"?>
+<?mso-contentType ?>
+<spe:Receivers xmlns:spe="http://schemas.microsoft.com/sharepoint/events">
+  <Receiver>
+    <Name>Document ID Generator</Name>
+    <Synchronization>Synchronous</Synchronization>
+    <Type>10001</Type>
+    <SequenceNumber>1000</SequenceNumber>
+    <Url/>
+    <Assembly>Microsoft.Office.DocumentManagement, Version=16.0.0.0, Culture=neutral, PublicKeyToken=71e9bce111e9429c</Assembly>
+    <Class>Microsoft.Office.DocumentManagement.Internal.DocIdHandler</Class>
+    <Data/>
+    <Filter/>
+  </Receiver>
+  <Receiver>
+    <Name>Document ID Generator</Name>
+    <Synchronization>Synchronous</Synchronization>
+    <Type>10002</Type>
+    <SequenceNumber>1001</SequenceNumber>
+    <Url/>
+    <Assembly>Microsoft.Office.DocumentManagement, Version=16.0.0.0, Culture=neutral, PublicKeyToken=71e9bce111e9429c</Assembly>
+    <Class>Microsoft.Office.DocumentManagement.Internal.DocIdHandler</Class>
+    <Data/>
+    <Filter/>
+  </Receiver>
+  <Receiver>
+    <Name>Document ID Generator</Name>
+    <Synchronization>Synchronous</Synchronization>
+    <Type>10004</Type>
+    <SequenceNumber>1002</SequenceNumber>
+    <Url/>
+    <Assembly>Microsoft.Office.DocumentManagement, Version=16.0.0.0, Culture=neutral, PublicKeyToken=71e9bce111e9429c</Assembly>
+    <Class>Microsoft.Office.DocumentManagement.Internal.DocIdHandler</Class>
+    <Data/>
+    <Filter/>
+  </Receiver>
+  <Receiver>
+    <Name>Document ID Generator</Name>
+    <Synchronization>Synchronous</Synchronization>
+    <Type>10006</Type>
+    <SequenceNumber>1003</SequenceNumber>
+    <Url/>
+    <Assembly>Microsoft.Office.DocumentManagement, Version=16.0.0.0, Culture=neutral, PublicKeyToken=71e9bce111e9429c</Assembly>
+    <Class>Microsoft.Office.DocumentManagement.Internal.DocIdHandler</Class>
+    <Data/>
+    <Filter/>
+  </Receiver>
+</spe:Receivers>
+</file>
+
+<file path=customXml/item4.xml><?xml version="1.0" encoding="utf-8"?>
+<?mso-contentType ?>
+<FormTemplates xmlns="http://schemas.microsoft.com/sharepoint/v3/contenttype/forms">
+  <Display>DocumentLibraryForm</Display>
+  <Edit>DocumentLibraryForm</Edit>
+  <New>DocumentLibraryForm</New>
+</FormTemplates>
+</file>
+
 <file path=customXml/itemProps1.xml><?xml version="1.0" encoding="utf-8"?>
+<ds:datastoreItem xmlns:ds="http://schemas.openxmlformats.org/officeDocument/2006/customXml" ds:itemID="{C64B5808-DACA-4273-92AE-F78AD06EB5C9}">
+  <ds:schemaRefs>
+    <ds:schemaRef ds:uri="43c4306d-bcae-48a3-b5b4-6245fba36c72"/>
+    <ds:schemaRef ds:uri="819a213c-e595-4af7-868c-5311d0f07b09"/>
+    <ds:schemaRef ds:uri="http://schemas.microsoft.com/office/2006/metadata/properties"/>
+    <ds:schemaRef ds:uri="http://schemas.microsoft.com/office/infopath/2007/PartnerControls"/>
+    <ds:schemaRef ds:uri="http://schemas.microsoft.com/sharepoint/v3"/>
+  </ds:schemaRefs>
+</ds:datastoreItem>
+</file>
+
+<file path=customXml/itemProps2.xml><?xml version="1.0" encoding="utf-8"?>
+<ds:datastoreItem xmlns:ds="http://schemas.openxmlformats.org/officeDocument/2006/customXml" ds:itemID="{8F325A96-F9CD-4C1F-BC68-5ED8156DC1C7}">
+  <ds:schemaRefs>
+    <ds:schemaRef ds:uri="43c4306d-bcae-48a3-b5b4-6245fba36c72"/>
+    <ds:schemaRef ds:uri="819a213c-e595-4af7-868c-5311d0f07b09"/>
+    <ds:schemaRef ds:uri="http://purl.org/dc/elements/1.1/"/>
+    <ds:schemaRef ds:uri="http://purl.org/dc/terms/"/>
+    <ds:schemaRef ds:uri="http://schemas.microsoft.com/internal/obd"/>
+    <ds:schemaRef ds:uri="http://schemas.microsoft.com/office/2006/documentManagement/types"/>
+    <ds:schemaRef ds:uri="http://schemas.microsoft.com/office/2006/metadata/contentType"/>
+    <ds:schemaRef ds:uri="http://schemas.microsoft.com/office/2006/metadata/properties"/>
+    <ds:schemaRef ds:uri="http://schemas.microsoft.com/office/2006/metadata/properties/metaAttributes"/>
+    <ds:schemaRef ds:uri="http://schemas.microsoft.com/office/infopath/2007/PartnerControls"/>
+    <ds:schemaRef ds:uri="http://schemas.microsoft.com/sharepoint/v3"/>
+    <ds:schemaRef ds:uri="http://schemas.openxmlformats.org/package/2006/metadata/core-properties"/>
+    <ds:schemaRef ds:uri="http://www.w3.org/2001/XMLSchema"/>
+  </ds:schemaRefs>
+</ds:datastoreItem>
+</file>
+
+<file path=customXml/itemProps3.xml><?xml version="1.0" encoding="utf-8"?>
 <ds:datastoreItem xmlns:ds="http://schemas.openxmlformats.org/officeDocument/2006/customXml" ds:itemID="{1C5A9CCD-8D95-4E29-9BBC-62ED344D200A}">
   <ds:schemaRefs>
     <ds:schemaRef ds:uri="http://schemas.microsoft.com/sharepoint/events"/>
@@ -27645,42 +27905,10 @@
 </ds:datastoreItem>
 </file>
 
-<file path=customXml/itemProps2.xml><?xml version="1.0" encoding="utf-8"?>
+<file path=customXml/itemProps4.xml><?xml version="1.0" encoding="utf-8"?>
 <ds:datastoreItem xmlns:ds="http://schemas.openxmlformats.org/officeDocument/2006/customXml" ds:itemID="{D5CBC06A-5433-41AC-89E1-93399C4B6D23}">
   <ds:schemaRefs>
     <ds:schemaRef ds:uri="http://schemas.microsoft.com/sharepoint/v3/contenttype/forms"/>
-  </ds:schemaRefs>
-</ds:datastoreItem>
-</file>
-
-<file path=customXml/itemProps3.xml><?xml version="1.0" encoding="utf-8"?>
-<ds:datastoreItem xmlns:ds="http://schemas.openxmlformats.org/officeDocument/2006/customXml" ds:itemID="{C64B5808-DACA-4273-92AE-F78AD06EB5C9}">
-  <ds:schemaRefs>
-    <ds:schemaRef ds:uri="http://schemas.microsoft.com/office/2006/metadata/properties"/>
-    <ds:schemaRef ds:uri="http://schemas.microsoft.com/office/infopath/2007/PartnerControls"/>
-    <ds:schemaRef ds:uri="819a213c-e595-4af7-868c-5311d0f07b09"/>
-    <ds:schemaRef ds:uri="http://schemas.microsoft.com/sharepoint/v3"/>
-    <ds:schemaRef ds:uri="43c4306d-bcae-48a3-b5b4-6245fba36c72"/>
-  </ds:schemaRefs>
-</ds:datastoreItem>
-</file>
-
-<file path=customXml/itemProps4.xml><?xml version="1.0" encoding="utf-8"?>
-<ds:datastoreItem xmlns:ds="http://schemas.openxmlformats.org/officeDocument/2006/customXml" ds:itemID="{8F325A96-F9CD-4C1F-BC68-5ED8156DC1C7}">
-  <ds:schemaRefs>
-    <ds:schemaRef ds:uri="http://schemas.microsoft.com/office/2006/metadata/contentType"/>
-    <ds:schemaRef ds:uri="http://schemas.microsoft.com/office/2006/metadata/properties/metaAttributes"/>
-    <ds:schemaRef ds:uri="http://www.w3.org/2001/XMLSchema"/>
-    <ds:schemaRef ds:uri="http://schemas.microsoft.com/office/2006/metadata/properties"/>
-    <ds:schemaRef ds:uri="http://schemas.microsoft.com/sharepoint/v3"/>
-    <ds:schemaRef ds:uri="819a213c-e595-4af7-868c-5311d0f07b09"/>
-    <ds:schemaRef ds:uri="43c4306d-bcae-48a3-b5b4-6245fba36c72"/>
-    <ds:schemaRef ds:uri="http://schemas.microsoft.com/office/2006/documentManagement/types"/>
-    <ds:schemaRef ds:uri="http://schemas.microsoft.com/office/infopath/2007/PartnerControls"/>
-    <ds:schemaRef ds:uri="http://schemas.openxmlformats.org/package/2006/metadata/core-properties"/>
-    <ds:schemaRef ds:uri="http://purl.org/dc/elements/1.1/"/>
-    <ds:schemaRef ds:uri="http://purl.org/dc/terms/"/>
-    <ds:schemaRef ds:uri="http://schemas.microsoft.com/internal/obd"/>
   </ds:schemaRefs>
 </ds:datastoreItem>
 </file>

</xml_diff>